<commit_message>
uses Royal family example for PowerPoint content
</commit_message>
<xml_diff>
--- a/QueenVictoria.pptx
+++ b/QueenVictoria.pptx
@@ -14,6 +14,7 @@
     <p:sldId id="262" r:id="rId12"/>
     <p:sldId id="263" r:id="rId13"/>
     <p:sldId id="264" r:id="rId14"/>
+    <p:sldId id="265" r:id="rId15"/>
   </p:sldIdLst>
   <p:sldSz cx="9144000" cy="6858000" type="screen4x3"/>
   <p:notesSz cx="6858000" cy="9144000"/>
@@ -3099,7 +3100,69 @@
                   <a:srgbClr val="0000FF"/>
                 </a:solidFill>
               </a:rPr>
-              <a:t>Slide 1</a:t>
+              <a:t>Victoria Hanover</a:t>
+            </a:r>
+          </a:p>
+        </p:txBody>
+      </p:sp>
+    </p:spTree>
+  </p:cSld>
+  <p:clrMapOvr>
+    <a:masterClrMapping/>
+  </p:clrMapOvr>
+</p:sld>
+</file>
+
+<file path=ppt/slides/slide10.xml><?xml version="1.0" encoding="utf-8"?>
+<p:sld xmlns:p="http://schemas.openxmlformats.org/presentationml/2006/main" xmlns:a="http://schemas.openxmlformats.org/drawingml/2006/main">
+  <p:cSld>
+    <p:spTree>
+      <p:nvGrpSpPr>
+        <p:cNvPr id="1" name=""/>
+        <p:cNvGrpSpPr/>
+        <p:nvPr/>
+      </p:nvGrpSpPr>
+      <p:grpSpPr>
+        <a:xfrm>
+          <a:off x="0" y="0"/>
+          <a:ext cx="0" cy="0"/>
+          <a:chOff x="0" y="0"/>
+          <a:chExt cx="0" cy="0"/>
+        </a:xfrm>
+      </p:grpSpPr>
+      <p:sp>
+        <p:nvSpPr>
+          <p:cNvPr name="TextBox 1" id="2"/>
+          <p:cNvSpPr txBox="true"/>
+          <p:nvPr/>
+        </p:nvSpPr>
+        <p:spPr>
+          <a:xfrm>
+            <a:off x="254000" y="254000"/>
+            <a:ext cx="2540000" cy="2540000"/>
+          </a:xfrm>
+          <a:prstGeom prst="rect">
+            <a:avLst/>
+          </a:prstGeom>
+        </p:spPr>
+        <p:txBody>
+          <a:bodyPr anchor="t" rtlCol="false"/>
+          <a:lstStyle/>
+          <a:p>
+            <a:pPr algn="l"/>
+            <a:r>
+              <a:t/>
+            </a:r>
+            <a:endParaRPr lang="en-US" sz="1100"/>
+          </a:p>
+          <a:p>
+            <a:r>
+              <a:rPr lang="en-US" sz="2400">
+                <a:solidFill>
+                  <a:srgbClr val="0000FF"/>
+                </a:solidFill>
+              </a:rPr>
+              <a:t>Beatrice Mary Victoria</a:t>
             </a:r>
           </a:p>
         </p:txBody>
@@ -3161,7 +3224,7 @@
                   <a:srgbClr val="0000FF"/>
                 </a:solidFill>
               </a:rPr>
-              <a:t>Slide 2</a:t>
+              <a:t>Victoria Adelaide Mary</a:t>
             </a:r>
           </a:p>
         </p:txBody>
@@ -3223,7 +3286,7 @@
                   <a:srgbClr val="0000FF"/>
                 </a:solidFill>
               </a:rPr>
-              <a:t>Slide 3</a:t>
+              <a:t>Edward_VII Wettin</a:t>
             </a:r>
           </a:p>
         </p:txBody>
@@ -3285,7 +3348,7 @@
                   <a:srgbClr val="0000FF"/>
                 </a:solidFill>
               </a:rPr>
-              <a:t>Slide 4</a:t>
+              <a:t>Alice Maud Mary</a:t>
             </a:r>
           </a:p>
         </p:txBody>
@@ -3347,7 +3410,7 @@
                   <a:srgbClr val="0000FF"/>
                 </a:solidFill>
               </a:rPr>
-              <a:t>Slide 5</a:t>
+              <a:t>Alfred Ernest Albert</a:t>
             </a:r>
           </a:p>
         </p:txBody>
@@ -3409,7 +3472,7 @@
                   <a:srgbClr val="0000FF"/>
                 </a:solidFill>
               </a:rPr>
-              <a:t>Slide 6</a:t>
+              <a:t>Helena Augusta Victoria</a:t>
             </a:r>
           </a:p>
         </p:txBody>
@@ -3471,7 +3534,7 @@
                   <a:srgbClr val="0000FF"/>
                 </a:solidFill>
               </a:rPr>
-              <a:t>Slide 7</a:t>
+              <a:t>Louise Caroline Alberta</a:t>
             </a:r>
           </a:p>
         </p:txBody>
@@ -3533,7 +3596,7 @@
                   <a:srgbClr val="0000FF"/>
                 </a:solidFill>
               </a:rPr>
-              <a:t>Slide 8</a:t>
+              <a:t>Arthur William Patrick</a:t>
             </a:r>
           </a:p>
         </p:txBody>
@@ -3595,7 +3658,7 @@
                   <a:srgbClr val="0000FF"/>
                 </a:solidFill>
               </a:rPr>
-              <a:t>Slide 9</a:t>
+              <a:t>Leopold George Duncan</a:t>
             </a:r>
           </a:p>
         </p:txBody>

</xml_diff>

<commit_message>
refactors to use initMap and have mysimplenode backlink in graph
</commit_message>
<xml_diff>
--- a/QueenVictoria.pptx
+++ b/QueenVictoria.pptx
@@ -3077,30 +3077,252 @@
         <p:spPr>
           <a:xfrm>
             <a:off x="254000" y="254000"/>
-            <a:ext cx="2540000" cy="2540000"/>
-          </a:xfrm>
-          <a:prstGeom prst="rect">
-            <a:avLst/>
-          </a:prstGeom>
-        </p:spPr>
-        <p:txBody>
-          <a:bodyPr anchor="t" rtlCol="false"/>
-          <a:lstStyle/>
-          <a:p>
-            <a:pPr algn="l"/>
-            <a:r>
-              <a:t/>
-            </a:r>
-            <a:endParaRPr lang="en-US" sz="1100"/>
-          </a:p>
-          <a:p>
-            <a:r>
-              <a:rPr lang="en-US" sz="2400">
-                <a:solidFill>
-                  <a:srgbClr val="0000FF"/>
-                </a:solidFill>
-              </a:rPr>
-              <a:t>Victoria Hanover</a:t>
+            <a:ext cx="7620000" cy="317500"/>
+          </a:xfrm>
+          <a:prstGeom prst="rect">
+            <a:avLst/>
+          </a:prstGeom>
+        </p:spPr>
+        <p:txBody>
+          <a:bodyPr anchor="t" rtlCol="false"/>
+          <a:lstStyle/>
+          <a:p>
+            <a:pPr algn="l"/>
+            <a:r>
+              <a:t/>
+            </a:r>
+            <a:endParaRPr lang="en-US" sz="1100"/>
+          </a:p>
+          <a:p>
+            <a:r>
+              <a:rPr lang="en-US" sz="2400">
+                <a:solidFill>
+                  <a:srgbClr val="0000FF"/>
+                </a:solidFill>
+              </a:rPr>
+              <a:t>name:Victoria Hanover</a:t>
+            </a:r>
+          </a:p>
+        </p:txBody>
+      </p:sp>
+      <p:sp>
+        <p:nvSpPr>
+          <p:cNvPr name="TextBox 2" id="3"/>
+          <p:cNvSpPr txBox="true"/>
+          <p:nvPr/>
+        </p:nvSpPr>
+        <p:spPr>
+          <a:xfrm>
+            <a:off x="254000" y="571500"/>
+            <a:ext cx="7620000" cy="317500"/>
+          </a:xfrm>
+          <a:prstGeom prst="rect">
+            <a:avLst/>
+          </a:prstGeom>
+        </p:spPr>
+        <p:txBody>
+          <a:bodyPr anchor="t" rtlCol="false"/>
+          <a:lstStyle/>
+          <a:p>
+            <a:pPr algn="l"/>
+            <a:r>
+              <a:t/>
+            </a:r>
+            <a:endParaRPr lang="en-US" sz="1100"/>
+          </a:p>
+          <a:p>
+            <a:r>
+              <a:rPr lang="en-US" sz="2400">
+                <a:solidFill>
+                  <a:srgbClr val="0000FF"/>
+                </a:solidFill>
+              </a:rPr>
+              <a:t>nobleTitle:Queen of England</a:t>
+            </a:r>
+          </a:p>
+        </p:txBody>
+      </p:sp>
+      <p:sp>
+        <p:nvSpPr>
+          <p:cNvPr name="TextBox 3" id="4"/>
+          <p:cNvSpPr txBox="true"/>
+          <p:nvPr/>
+        </p:nvSpPr>
+        <p:spPr>
+          <a:xfrm>
+            <a:off x="254000" y="889000"/>
+            <a:ext cx="7620000" cy="317500"/>
+          </a:xfrm>
+          <a:prstGeom prst="rect">
+            <a:avLst/>
+          </a:prstGeom>
+        </p:spPr>
+        <p:txBody>
+          <a:bodyPr anchor="t" rtlCol="false"/>
+          <a:lstStyle/>
+          <a:p>
+            <a:pPr algn="l"/>
+            <a:r>
+              <a:t/>
+            </a:r>
+            <a:endParaRPr lang="en-US" sz="1100"/>
+          </a:p>
+          <a:p>
+            <a:r>
+              <a:rPr lang="en-US" sz="2400">
+                <a:solidFill>
+                  <a:srgbClr val="0000FF"/>
+                </a:solidFill>
+              </a:rPr>
+              <a:t>sex:female</a:t>
+            </a:r>
+          </a:p>
+        </p:txBody>
+      </p:sp>
+      <p:sp>
+        <p:nvSpPr>
+          <p:cNvPr name="TextBox 4" id="5"/>
+          <p:cNvSpPr txBox="true"/>
+          <p:nvPr/>
+        </p:nvSpPr>
+        <p:spPr>
+          <a:xfrm>
+            <a:off x="254000" y="1206500"/>
+            <a:ext cx="7620000" cy="317500"/>
+          </a:xfrm>
+          <a:prstGeom prst="rect">
+            <a:avLst/>
+          </a:prstGeom>
+        </p:spPr>
+        <p:txBody>
+          <a:bodyPr anchor="t" rtlCol="false"/>
+          <a:lstStyle/>
+          <a:p>
+            <a:pPr algn="l"/>
+            <a:r>
+              <a:t/>
+            </a:r>
+            <a:endParaRPr lang="en-US" sz="1100"/>
+          </a:p>
+          <a:p>
+            <a:r>
+              <a:rPr lang="en-US" sz="2400">
+                <a:solidFill>
+                  <a:srgbClr val="0000FF"/>
+                </a:solidFill>
+              </a:rPr>
+              <a:t>yearBorn:1819</a:t>
+            </a:r>
+          </a:p>
+        </p:txBody>
+      </p:sp>
+      <p:sp>
+        <p:nvSpPr>
+          <p:cNvPr name="TextBox 5" id="6"/>
+          <p:cNvSpPr txBox="true"/>
+          <p:nvPr/>
+        </p:nvSpPr>
+        <p:spPr>
+          <a:xfrm>
+            <a:off x="254000" y="1524000"/>
+            <a:ext cx="7620000" cy="317500"/>
+          </a:xfrm>
+          <a:prstGeom prst="rect">
+            <a:avLst/>
+          </a:prstGeom>
+        </p:spPr>
+        <p:txBody>
+          <a:bodyPr anchor="t" rtlCol="false"/>
+          <a:lstStyle/>
+          <a:p>
+            <a:pPr algn="l"/>
+            <a:r>
+              <a:t/>
+            </a:r>
+            <a:endParaRPr lang="en-US" sz="1100"/>
+          </a:p>
+          <a:p>
+            <a:r>
+              <a:rPr lang="en-US" sz="2400">
+                <a:solidFill>
+                  <a:srgbClr val="0000FF"/>
+                </a:solidFill>
+              </a:rPr>
+              <a:t>birthPlace:Kensington,Palace,London,England</a:t>
+            </a:r>
+          </a:p>
+        </p:txBody>
+      </p:sp>
+      <p:sp>
+        <p:nvSpPr>
+          <p:cNvPr name="TextBox 6" id="7"/>
+          <p:cNvSpPr txBox="true"/>
+          <p:nvPr/>
+        </p:nvSpPr>
+        <p:spPr>
+          <a:xfrm>
+            <a:off x="254000" y="1841500"/>
+            <a:ext cx="7620000" cy="317500"/>
+          </a:xfrm>
+          <a:prstGeom prst="rect">
+            <a:avLst/>
+          </a:prstGeom>
+        </p:spPr>
+        <p:txBody>
+          <a:bodyPr anchor="t" rtlCol="false"/>
+          <a:lstStyle/>
+          <a:p>
+            <a:pPr algn="l"/>
+            <a:r>
+              <a:t/>
+            </a:r>
+            <a:endParaRPr lang="en-US" sz="1100"/>
+          </a:p>
+          <a:p>
+            <a:r>
+              <a:rPr lang="en-US" sz="2400">
+                <a:solidFill>
+                  <a:srgbClr val="0000FF"/>
+                </a:solidFill>
+              </a:rPr>
+              <a:t>yearDied:1901</a:t>
+            </a:r>
+          </a:p>
+        </p:txBody>
+      </p:sp>
+      <p:sp>
+        <p:nvSpPr>
+          <p:cNvPr name="TextBox 7" id="8"/>
+          <p:cNvSpPr txBox="true"/>
+          <p:nvPr/>
+        </p:nvSpPr>
+        <p:spPr>
+          <a:xfrm>
+            <a:off x="254000" y="2159000"/>
+            <a:ext cx="7620000" cy="317500"/>
+          </a:xfrm>
+          <a:prstGeom prst="rect">
+            <a:avLst/>
+          </a:prstGeom>
+        </p:spPr>
+        <p:txBody>
+          <a:bodyPr anchor="t" rtlCol="false"/>
+          <a:lstStyle/>
+          <a:p>
+            <a:pPr algn="l"/>
+            <a:r>
+              <a:t/>
+            </a:r>
+            <a:endParaRPr lang="en-US" sz="1100"/>
+          </a:p>
+          <a:p>
+            <a:r>
+              <a:rPr lang="en-US" sz="2400">
+                <a:solidFill>
+                  <a:srgbClr val="0000FF"/>
+                </a:solidFill>
+              </a:rPr>
+              <a:t>diedAt:Royal Mausoleum,Frogmore,Berkshire,England</a:t>
             </a:r>
           </a:p>
         </p:txBody>
@@ -3139,30 +3361,252 @@
         <p:spPr>
           <a:xfrm>
             <a:off x="254000" y="254000"/>
-            <a:ext cx="2540000" cy="2540000"/>
-          </a:xfrm>
-          <a:prstGeom prst="rect">
-            <a:avLst/>
-          </a:prstGeom>
-        </p:spPr>
-        <p:txBody>
-          <a:bodyPr anchor="t" rtlCol="false"/>
-          <a:lstStyle/>
-          <a:p>
-            <a:pPr algn="l"/>
-            <a:r>
-              <a:t/>
-            </a:r>
-            <a:endParaRPr lang="en-US" sz="1100"/>
-          </a:p>
-          <a:p>
-            <a:r>
-              <a:rPr lang="en-US" sz="2400">
-                <a:solidFill>
-                  <a:srgbClr val="0000FF"/>
-                </a:solidFill>
-              </a:rPr>
-              <a:t>Beatrice Mary Victoria</a:t>
+            <a:ext cx="7620000" cy="317500"/>
+          </a:xfrm>
+          <a:prstGeom prst="rect">
+            <a:avLst/>
+          </a:prstGeom>
+        </p:spPr>
+        <p:txBody>
+          <a:bodyPr anchor="t" rtlCol="false"/>
+          <a:lstStyle/>
+          <a:p>
+            <a:pPr algn="l"/>
+            <a:r>
+              <a:t/>
+            </a:r>
+            <a:endParaRPr lang="en-US" sz="1100"/>
+          </a:p>
+          <a:p>
+            <a:r>
+              <a:rPr lang="en-US" sz="2400">
+                <a:solidFill>
+                  <a:srgbClr val="0000FF"/>
+                </a:solidFill>
+              </a:rPr>
+              <a:t>name:Beatrice Mary Victoria</a:t>
+            </a:r>
+          </a:p>
+        </p:txBody>
+      </p:sp>
+      <p:sp>
+        <p:nvSpPr>
+          <p:cNvPr name="TextBox 2" id="3"/>
+          <p:cNvSpPr txBox="true"/>
+          <p:nvPr/>
+        </p:nvSpPr>
+        <p:spPr>
+          <a:xfrm>
+            <a:off x="254000" y="571500"/>
+            <a:ext cx="7620000" cy="317500"/>
+          </a:xfrm>
+          <a:prstGeom prst="rect">
+            <a:avLst/>
+          </a:prstGeom>
+        </p:spPr>
+        <p:txBody>
+          <a:bodyPr anchor="t" rtlCol="false"/>
+          <a:lstStyle/>
+          <a:p>
+            <a:pPr algn="l"/>
+            <a:r>
+              <a:t/>
+            </a:r>
+            <a:endParaRPr lang="en-US" sz="1100"/>
+          </a:p>
+          <a:p>
+            <a:r>
+              <a:rPr lang="en-US" sz="2400">
+                <a:solidFill>
+                  <a:srgbClr val="0000FF"/>
+                </a:solidFill>
+              </a:rPr>
+              <a:t>nobleTitle:Princess</a:t>
+            </a:r>
+          </a:p>
+        </p:txBody>
+      </p:sp>
+      <p:sp>
+        <p:nvSpPr>
+          <p:cNvPr name="TextBox 3" id="4"/>
+          <p:cNvSpPr txBox="true"/>
+          <p:nvPr/>
+        </p:nvSpPr>
+        <p:spPr>
+          <a:xfrm>
+            <a:off x="254000" y="889000"/>
+            <a:ext cx="7620000" cy="317500"/>
+          </a:xfrm>
+          <a:prstGeom prst="rect">
+            <a:avLst/>
+          </a:prstGeom>
+        </p:spPr>
+        <p:txBody>
+          <a:bodyPr anchor="t" rtlCol="false"/>
+          <a:lstStyle/>
+          <a:p>
+            <a:pPr algn="l"/>
+            <a:r>
+              <a:t/>
+            </a:r>
+            <a:endParaRPr lang="en-US" sz="1100"/>
+          </a:p>
+          <a:p>
+            <a:r>
+              <a:rPr lang="en-US" sz="2400">
+                <a:solidFill>
+                  <a:srgbClr val="0000FF"/>
+                </a:solidFill>
+              </a:rPr>
+              <a:t>sex:female</a:t>
+            </a:r>
+          </a:p>
+        </p:txBody>
+      </p:sp>
+      <p:sp>
+        <p:nvSpPr>
+          <p:cNvPr name="TextBox 4" id="5"/>
+          <p:cNvSpPr txBox="true"/>
+          <p:nvPr/>
+        </p:nvSpPr>
+        <p:spPr>
+          <a:xfrm>
+            <a:off x="254000" y="1206500"/>
+            <a:ext cx="7620000" cy="317500"/>
+          </a:xfrm>
+          <a:prstGeom prst="rect">
+            <a:avLst/>
+          </a:prstGeom>
+        </p:spPr>
+        <p:txBody>
+          <a:bodyPr anchor="t" rtlCol="false"/>
+          <a:lstStyle/>
+          <a:p>
+            <a:pPr algn="l"/>
+            <a:r>
+              <a:t/>
+            </a:r>
+            <a:endParaRPr lang="en-US" sz="1100"/>
+          </a:p>
+          <a:p>
+            <a:r>
+              <a:rPr lang="en-US" sz="2400">
+                <a:solidFill>
+                  <a:srgbClr val="0000FF"/>
+                </a:solidFill>
+              </a:rPr>
+              <a:t>yearBorn:1857</a:t>
+            </a:r>
+          </a:p>
+        </p:txBody>
+      </p:sp>
+      <p:sp>
+        <p:nvSpPr>
+          <p:cNvPr name="TextBox 5" id="6"/>
+          <p:cNvSpPr txBox="true"/>
+          <p:nvPr/>
+        </p:nvSpPr>
+        <p:spPr>
+          <a:xfrm>
+            <a:off x="254000" y="1524000"/>
+            <a:ext cx="7620000" cy="317500"/>
+          </a:xfrm>
+          <a:prstGeom prst="rect">
+            <a:avLst/>
+          </a:prstGeom>
+        </p:spPr>
+        <p:txBody>
+          <a:bodyPr anchor="t" rtlCol="false"/>
+          <a:lstStyle/>
+          <a:p>
+            <a:pPr algn="l"/>
+            <a:r>
+              <a:t/>
+            </a:r>
+            <a:endParaRPr lang="en-US" sz="1100"/>
+          </a:p>
+          <a:p>
+            <a:r>
+              <a:rPr lang="en-US" sz="2400">
+                <a:solidFill>
+                  <a:srgbClr val="0000FF"/>
+                </a:solidFill>
+              </a:rPr>
+              <a:t>birthPlace:Buckingham,Palace,London,England</a:t>
+            </a:r>
+          </a:p>
+        </p:txBody>
+      </p:sp>
+      <p:sp>
+        <p:nvSpPr>
+          <p:cNvPr name="TextBox 6" id="7"/>
+          <p:cNvSpPr txBox="true"/>
+          <p:nvPr/>
+        </p:nvSpPr>
+        <p:spPr>
+          <a:xfrm>
+            <a:off x="254000" y="1841500"/>
+            <a:ext cx="7620000" cy="317500"/>
+          </a:xfrm>
+          <a:prstGeom prst="rect">
+            <a:avLst/>
+          </a:prstGeom>
+        </p:spPr>
+        <p:txBody>
+          <a:bodyPr anchor="t" rtlCol="false"/>
+          <a:lstStyle/>
+          <a:p>
+            <a:pPr algn="l"/>
+            <a:r>
+              <a:t/>
+            </a:r>
+            <a:endParaRPr lang="en-US" sz="1100"/>
+          </a:p>
+          <a:p>
+            <a:r>
+              <a:rPr lang="en-US" sz="2400">
+                <a:solidFill>
+                  <a:srgbClr val="0000FF"/>
+                </a:solidFill>
+              </a:rPr>
+              <a:t>yearDied:1944</a:t>
+            </a:r>
+          </a:p>
+        </p:txBody>
+      </p:sp>
+      <p:sp>
+        <p:nvSpPr>
+          <p:cNvPr name="TextBox 7" id="8"/>
+          <p:cNvSpPr txBox="true"/>
+          <p:nvPr/>
+        </p:nvSpPr>
+        <p:spPr>
+          <a:xfrm>
+            <a:off x="254000" y="2159000"/>
+            <a:ext cx="7620000" cy="317500"/>
+          </a:xfrm>
+          <a:prstGeom prst="rect">
+            <a:avLst/>
+          </a:prstGeom>
+        </p:spPr>
+        <p:txBody>
+          <a:bodyPr anchor="t" rtlCol="false"/>
+          <a:lstStyle/>
+          <a:p>
+            <a:pPr algn="l"/>
+            <a:r>
+              <a:t/>
+            </a:r>
+            <a:endParaRPr lang="en-US" sz="1100"/>
+          </a:p>
+          <a:p>
+            <a:r>
+              <a:rPr lang="en-US" sz="2400">
+                <a:solidFill>
+                  <a:srgbClr val="0000FF"/>
+                </a:solidFill>
+              </a:rPr>
+              <a:t>diedAt:Bantridge Park,Balcombe,Sussex,England</a:t>
             </a:r>
           </a:p>
         </p:txBody>
@@ -3201,30 +3645,252 @@
         <p:spPr>
           <a:xfrm>
             <a:off x="254000" y="254000"/>
-            <a:ext cx="2540000" cy="2540000"/>
-          </a:xfrm>
-          <a:prstGeom prst="rect">
-            <a:avLst/>
-          </a:prstGeom>
-        </p:spPr>
-        <p:txBody>
-          <a:bodyPr anchor="t" rtlCol="false"/>
-          <a:lstStyle/>
-          <a:p>
-            <a:pPr algn="l"/>
-            <a:r>
-              <a:t/>
-            </a:r>
-            <a:endParaRPr lang="en-US" sz="1100"/>
-          </a:p>
-          <a:p>
-            <a:r>
-              <a:rPr lang="en-US" sz="2400">
-                <a:solidFill>
-                  <a:srgbClr val="0000FF"/>
-                </a:solidFill>
-              </a:rPr>
-              <a:t>Victoria Adelaide Mary</a:t>
+            <a:ext cx="7620000" cy="317500"/>
+          </a:xfrm>
+          <a:prstGeom prst="rect">
+            <a:avLst/>
+          </a:prstGeom>
+        </p:spPr>
+        <p:txBody>
+          <a:bodyPr anchor="t" rtlCol="false"/>
+          <a:lstStyle/>
+          <a:p>
+            <a:pPr algn="l"/>
+            <a:r>
+              <a:t/>
+            </a:r>
+            <a:endParaRPr lang="en-US" sz="1100"/>
+          </a:p>
+          <a:p>
+            <a:r>
+              <a:rPr lang="en-US" sz="2400">
+                <a:solidFill>
+                  <a:srgbClr val="0000FF"/>
+                </a:solidFill>
+              </a:rPr>
+              <a:t>name:Victoria Adelaide Mary</a:t>
+            </a:r>
+          </a:p>
+        </p:txBody>
+      </p:sp>
+      <p:sp>
+        <p:nvSpPr>
+          <p:cNvPr name="TextBox 2" id="3"/>
+          <p:cNvSpPr txBox="true"/>
+          <p:nvPr/>
+        </p:nvSpPr>
+        <p:spPr>
+          <a:xfrm>
+            <a:off x="254000" y="571500"/>
+            <a:ext cx="7620000" cy="317500"/>
+          </a:xfrm>
+          <a:prstGeom prst="rect">
+            <a:avLst/>
+          </a:prstGeom>
+        </p:spPr>
+        <p:txBody>
+          <a:bodyPr anchor="t" rtlCol="false"/>
+          <a:lstStyle/>
+          <a:p>
+            <a:pPr algn="l"/>
+            <a:r>
+              <a:t/>
+            </a:r>
+            <a:endParaRPr lang="en-US" sz="1100"/>
+          </a:p>
+          <a:p>
+            <a:r>
+              <a:rPr lang="en-US" sz="2400">
+                <a:solidFill>
+                  <a:srgbClr val="0000FF"/>
+                </a:solidFill>
+              </a:rPr>
+              <a:t>nobleTitle:Princess Royal</a:t>
+            </a:r>
+          </a:p>
+        </p:txBody>
+      </p:sp>
+      <p:sp>
+        <p:nvSpPr>
+          <p:cNvPr name="TextBox 3" id="4"/>
+          <p:cNvSpPr txBox="true"/>
+          <p:nvPr/>
+        </p:nvSpPr>
+        <p:spPr>
+          <a:xfrm>
+            <a:off x="254000" y="889000"/>
+            <a:ext cx="7620000" cy="317500"/>
+          </a:xfrm>
+          <a:prstGeom prst="rect">
+            <a:avLst/>
+          </a:prstGeom>
+        </p:spPr>
+        <p:txBody>
+          <a:bodyPr anchor="t" rtlCol="false"/>
+          <a:lstStyle/>
+          <a:p>
+            <a:pPr algn="l"/>
+            <a:r>
+              <a:t/>
+            </a:r>
+            <a:endParaRPr lang="en-US" sz="1100"/>
+          </a:p>
+          <a:p>
+            <a:r>
+              <a:rPr lang="en-US" sz="2400">
+                <a:solidFill>
+                  <a:srgbClr val="0000FF"/>
+                </a:solidFill>
+              </a:rPr>
+              <a:t>sex:female</a:t>
+            </a:r>
+          </a:p>
+        </p:txBody>
+      </p:sp>
+      <p:sp>
+        <p:nvSpPr>
+          <p:cNvPr name="TextBox 4" id="5"/>
+          <p:cNvSpPr txBox="true"/>
+          <p:nvPr/>
+        </p:nvSpPr>
+        <p:spPr>
+          <a:xfrm>
+            <a:off x="254000" y="1206500"/>
+            <a:ext cx="7620000" cy="317500"/>
+          </a:xfrm>
+          <a:prstGeom prst="rect">
+            <a:avLst/>
+          </a:prstGeom>
+        </p:spPr>
+        <p:txBody>
+          <a:bodyPr anchor="t" rtlCol="false"/>
+          <a:lstStyle/>
+          <a:p>
+            <a:pPr algn="l"/>
+            <a:r>
+              <a:t/>
+            </a:r>
+            <a:endParaRPr lang="en-US" sz="1100"/>
+          </a:p>
+          <a:p>
+            <a:r>
+              <a:rPr lang="en-US" sz="2400">
+                <a:solidFill>
+                  <a:srgbClr val="0000FF"/>
+                </a:solidFill>
+              </a:rPr>
+              <a:t>yearBorn:1841</a:t>
+            </a:r>
+          </a:p>
+        </p:txBody>
+      </p:sp>
+      <p:sp>
+        <p:nvSpPr>
+          <p:cNvPr name="TextBox 5" id="6"/>
+          <p:cNvSpPr txBox="true"/>
+          <p:nvPr/>
+        </p:nvSpPr>
+        <p:spPr>
+          <a:xfrm>
+            <a:off x="254000" y="1524000"/>
+            <a:ext cx="7620000" cy="317500"/>
+          </a:xfrm>
+          <a:prstGeom prst="rect">
+            <a:avLst/>
+          </a:prstGeom>
+        </p:spPr>
+        <p:txBody>
+          <a:bodyPr anchor="t" rtlCol="false"/>
+          <a:lstStyle/>
+          <a:p>
+            <a:pPr algn="l"/>
+            <a:r>
+              <a:t/>
+            </a:r>
+            <a:endParaRPr lang="en-US" sz="1100"/>
+          </a:p>
+          <a:p>
+            <a:r>
+              <a:rPr lang="en-US" sz="2400">
+                <a:solidFill>
+                  <a:srgbClr val="0000FF"/>
+                </a:solidFill>
+              </a:rPr>
+              <a:t>birthPlace:Throne Room,Buckingham Palac,England</a:t>
+            </a:r>
+          </a:p>
+        </p:txBody>
+      </p:sp>
+      <p:sp>
+        <p:nvSpPr>
+          <p:cNvPr name="TextBox 6" id="7"/>
+          <p:cNvSpPr txBox="true"/>
+          <p:nvPr/>
+        </p:nvSpPr>
+        <p:spPr>
+          <a:xfrm>
+            <a:off x="254000" y="1841500"/>
+            <a:ext cx="7620000" cy="317500"/>
+          </a:xfrm>
+          <a:prstGeom prst="rect">
+            <a:avLst/>
+          </a:prstGeom>
+        </p:spPr>
+        <p:txBody>
+          <a:bodyPr anchor="t" rtlCol="false"/>
+          <a:lstStyle/>
+          <a:p>
+            <a:pPr algn="l"/>
+            <a:r>
+              <a:t/>
+            </a:r>
+            <a:endParaRPr lang="en-US" sz="1100"/>
+          </a:p>
+          <a:p>
+            <a:r>
+              <a:rPr lang="en-US" sz="2400">
+                <a:solidFill>
+                  <a:srgbClr val="0000FF"/>
+                </a:solidFill>
+              </a:rPr>
+              <a:t>yearDied:1901</a:t>
+            </a:r>
+          </a:p>
+        </p:txBody>
+      </p:sp>
+      <p:sp>
+        <p:nvSpPr>
+          <p:cNvPr name="TextBox 7" id="8"/>
+          <p:cNvSpPr txBox="true"/>
+          <p:nvPr/>
+        </p:nvSpPr>
+        <p:spPr>
+          <a:xfrm>
+            <a:off x="254000" y="2159000"/>
+            <a:ext cx="7620000" cy="317500"/>
+          </a:xfrm>
+          <a:prstGeom prst="rect">
+            <a:avLst/>
+          </a:prstGeom>
+        </p:spPr>
+        <p:txBody>
+          <a:bodyPr anchor="t" rtlCol="false"/>
+          <a:lstStyle/>
+          <a:p>
+            <a:pPr algn="l"/>
+            <a:r>
+              <a:t/>
+            </a:r>
+            <a:endParaRPr lang="en-US" sz="1100"/>
+          </a:p>
+          <a:p>
+            <a:r>
+              <a:rPr lang="en-US" sz="2400">
+                <a:solidFill>
+                  <a:srgbClr val="0000FF"/>
+                </a:solidFill>
+              </a:rPr>
+              <a:t>diedAt:Friedenskirche,Potsdam</a:t>
             </a:r>
           </a:p>
         </p:txBody>
@@ -3263,30 +3929,252 @@
         <p:spPr>
           <a:xfrm>
             <a:off x="254000" y="254000"/>
-            <a:ext cx="2540000" cy="2540000"/>
-          </a:xfrm>
-          <a:prstGeom prst="rect">
-            <a:avLst/>
-          </a:prstGeom>
-        </p:spPr>
-        <p:txBody>
-          <a:bodyPr anchor="t" rtlCol="false"/>
-          <a:lstStyle/>
-          <a:p>
-            <a:pPr algn="l"/>
-            <a:r>
-              <a:t/>
-            </a:r>
-            <a:endParaRPr lang="en-US" sz="1100"/>
-          </a:p>
-          <a:p>
-            <a:r>
-              <a:rPr lang="en-US" sz="2400">
-                <a:solidFill>
-                  <a:srgbClr val="0000FF"/>
-                </a:solidFill>
-              </a:rPr>
-              <a:t>Edward_VII Wettin</a:t>
+            <a:ext cx="7620000" cy="317500"/>
+          </a:xfrm>
+          <a:prstGeom prst="rect">
+            <a:avLst/>
+          </a:prstGeom>
+        </p:spPr>
+        <p:txBody>
+          <a:bodyPr anchor="t" rtlCol="false"/>
+          <a:lstStyle/>
+          <a:p>
+            <a:pPr algn="l"/>
+            <a:r>
+              <a:t/>
+            </a:r>
+            <a:endParaRPr lang="en-US" sz="1100"/>
+          </a:p>
+          <a:p>
+            <a:r>
+              <a:rPr lang="en-US" sz="2400">
+                <a:solidFill>
+                  <a:srgbClr val="0000FF"/>
+                </a:solidFill>
+              </a:rPr>
+              <a:t>name:Edward_VII Wettin</a:t>
+            </a:r>
+          </a:p>
+        </p:txBody>
+      </p:sp>
+      <p:sp>
+        <p:nvSpPr>
+          <p:cNvPr name="TextBox 2" id="3"/>
+          <p:cNvSpPr txBox="true"/>
+          <p:nvPr/>
+        </p:nvSpPr>
+        <p:spPr>
+          <a:xfrm>
+            <a:off x="254000" y="571500"/>
+            <a:ext cx="7620000" cy="317500"/>
+          </a:xfrm>
+          <a:prstGeom prst="rect">
+            <a:avLst/>
+          </a:prstGeom>
+        </p:spPr>
+        <p:txBody>
+          <a:bodyPr anchor="t" rtlCol="false"/>
+          <a:lstStyle/>
+          <a:p>
+            <a:pPr algn="l"/>
+            <a:r>
+              <a:t/>
+            </a:r>
+            <a:endParaRPr lang="en-US" sz="1100"/>
+          </a:p>
+          <a:p>
+            <a:r>
+              <a:rPr lang="en-US" sz="2400">
+                <a:solidFill>
+                  <a:srgbClr val="0000FF"/>
+                </a:solidFill>
+              </a:rPr>
+              <a:t>nobleTitle:King of England</a:t>
+            </a:r>
+          </a:p>
+        </p:txBody>
+      </p:sp>
+      <p:sp>
+        <p:nvSpPr>
+          <p:cNvPr name="TextBox 3" id="4"/>
+          <p:cNvSpPr txBox="true"/>
+          <p:nvPr/>
+        </p:nvSpPr>
+        <p:spPr>
+          <a:xfrm>
+            <a:off x="254000" y="889000"/>
+            <a:ext cx="7620000" cy="317500"/>
+          </a:xfrm>
+          <a:prstGeom prst="rect">
+            <a:avLst/>
+          </a:prstGeom>
+        </p:spPr>
+        <p:txBody>
+          <a:bodyPr anchor="t" rtlCol="false"/>
+          <a:lstStyle/>
+          <a:p>
+            <a:pPr algn="l"/>
+            <a:r>
+              <a:t/>
+            </a:r>
+            <a:endParaRPr lang="en-US" sz="1100"/>
+          </a:p>
+          <a:p>
+            <a:r>
+              <a:rPr lang="en-US" sz="2400">
+                <a:solidFill>
+                  <a:srgbClr val="0000FF"/>
+                </a:solidFill>
+              </a:rPr>
+              <a:t>sex:male</a:t>
+            </a:r>
+          </a:p>
+        </p:txBody>
+      </p:sp>
+      <p:sp>
+        <p:nvSpPr>
+          <p:cNvPr name="TextBox 4" id="5"/>
+          <p:cNvSpPr txBox="true"/>
+          <p:nvPr/>
+        </p:nvSpPr>
+        <p:spPr>
+          <a:xfrm>
+            <a:off x="254000" y="1206500"/>
+            <a:ext cx="7620000" cy="317500"/>
+          </a:xfrm>
+          <a:prstGeom prst="rect">
+            <a:avLst/>
+          </a:prstGeom>
+        </p:spPr>
+        <p:txBody>
+          <a:bodyPr anchor="t" rtlCol="false"/>
+          <a:lstStyle/>
+          <a:p>
+            <a:pPr algn="l"/>
+            <a:r>
+              <a:t/>
+            </a:r>
+            <a:endParaRPr lang="en-US" sz="1100"/>
+          </a:p>
+          <a:p>
+            <a:r>
+              <a:rPr lang="en-US" sz="2400">
+                <a:solidFill>
+                  <a:srgbClr val="0000FF"/>
+                </a:solidFill>
+              </a:rPr>
+              <a:t>yearBorn:1841</a:t>
+            </a:r>
+          </a:p>
+        </p:txBody>
+      </p:sp>
+      <p:sp>
+        <p:nvSpPr>
+          <p:cNvPr name="TextBox 5" id="6"/>
+          <p:cNvSpPr txBox="true"/>
+          <p:nvPr/>
+        </p:nvSpPr>
+        <p:spPr>
+          <a:xfrm>
+            <a:off x="254000" y="1524000"/>
+            <a:ext cx="7620000" cy="317500"/>
+          </a:xfrm>
+          <a:prstGeom prst="rect">
+            <a:avLst/>
+          </a:prstGeom>
+        </p:spPr>
+        <p:txBody>
+          <a:bodyPr anchor="t" rtlCol="false"/>
+          <a:lstStyle/>
+          <a:p>
+            <a:pPr algn="l"/>
+            <a:r>
+              <a:t/>
+            </a:r>
+            <a:endParaRPr lang="en-US" sz="1100"/>
+          </a:p>
+          <a:p>
+            <a:r>
+              <a:rPr lang="en-US" sz="2400">
+                <a:solidFill>
+                  <a:srgbClr val="0000FF"/>
+                </a:solidFill>
+              </a:rPr>
+              <a:t>birthPlace:Buckingham,Palace,London,England</a:t>
+            </a:r>
+          </a:p>
+        </p:txBody>
+      </p:sp>
+      <p:sp>
+        <p:nvSpPr>
+          <p:cNvPr name="TextBox 6" id="7"/>
+          <p:cNvSpPr txBox="true"/>
+          <p:nvPr/>
+        </p:nvSpPr>
+        <p:spPr>
+          <a:xfrm>
+            <a:off x="254000" y="1841500"/>
+            <a:ext cx="7620000" cy="317500"/>
+          </a:xfrm>
+          <a:prstGeom prst="rect">
+            <a:avLst/>
+          </a:prstGeom>
+        </p:spPr>
+        <p:txBody>
+          <a:bodyPr anchor="t" rtlCol="false"/>
+          <a:lstStyle/>
+          <a:p>
+            <a:pPr algn="l"/>
+            <a:r>
+              <a:t/>
+            </a:r>
+            <a:endParaRPr lang="en-US" sz="1100"/>
+          </a:p>
+          <a:p>
+            <a:r>
+              <a:rPr lang="en-US" sz="2400">
+                <a:solidFill>
+                  <a:srgbClr val="0000FF"/>
+                </a:solidFill>
+              </a:rPr>
+              <a:t>yearDied:1910</a:t>
+            </a:r>
+          </a:p>
+        </p:txBody>
+      </p:sp>
+      <p:sp>
+        <p:nvSpPr>
+          <p:cNvPr name="TextBox 7" id="8"/>
+          <p:cNvSpPr txBox="true"/>
+          <p:nvPr/>
+        </p:nvSpPr>
+        <p:spPr>
+          <a:xfrm>
+            <a:off x="254000" y="2159000"/>
+            <a:ext cx="7620000" cy="317500"/>
+          </a:xfrm>
+          <a:prstGeom prst="rect">
+            <a:avLst/>
+          </a:prstGeom>
+        </p:spPr>
+        <p:txBody>
+          <a:bodyPr anchor="t" rtlCol="false"/>
+          <a:lstStyle/>
+          <a:p>
+            <a:pPr algn="l"/>
+            <a:r>
+              <a:t/>
+            </a:r>
+            <a:endParaRPr lang="en-US" sz="1100"/>
+          </a:p>
+          <a:p>
+            <a:r>
+              <a:rPr lang="en-US" sz="2400">
+                <a:solidFill>
+                  <a:srgbClr val="0000FF"/>
+                </a:solidFill>
+              </a:rPr>
+              <a:t>diedAt:Windsor,Berkshire,England</a:t>
             </a:r>
           </a:p>
         </p:txBody>
@@ -3325,30 +4213,252 @@
         <p:spPr>
           <a:xfrm>
             <a:off x="254000" y="254000"/>
-            <a:ext cx="2540000" cy="2540000"/>
-          </a:xfrm>
-          <a:prstGeom prst="rect">
-            <a:avLst/>
-          </a:prstGeom>
-        </p:spPr>
-        <p:txBody>
-          <a:bodyPr anchor="t" rtlCol="false"/>
-          <a:lstStyle/>
-          <a:p>
-            <a:pPr algn="l"/>
-            <a:r>
-              <a:t/>
-            </a:r>
-            <a:endParaRPr lang="en-US" sz="1100"/>
-          </a:p>
-          <a:p>
-            <a:r>
-              <a:rPr lang="en-US" sz="2400">
-                <a:solidFill>
-                  <a:srgbClr val="0000FF"/>
-                </a:solidFill>
-              </a:rPr>
-              <a:t>Alice Maud Mary</a:t>
+            <a:ext cx="7620000" cy="317500"/>
+          </a:xfrm>
+          <a:prstGeom prst="rect">
+            <a:avLst/>
+          </a:prstGeom>
+        </p:spPr>
+        <p:txBody>
+          <a:bodyPr anchor="t" rtlCol="false"/>
+          <a:lstStyle/>
+          <a:p>
+            <a:pPr algn="l"/>
+            <a:r>
+              <a:t/>
+            </a:r>
+            <a:endParaRPr lang="en-US" sz="1100"/>
+          </a:p>
+          <a:p>
+            <a:r>
+              <a:rPr lang="en-US" sz="2400">
+                <a:solidFill>
+                  <a:srgbClr val="0000FF"/>
+                </a:solidFill>
+              </a:rPr>
+              <a:t>name:Alice Maud Mary</a:t>
+            </a:r>
+          </a:p>
+        </p:txBody>
+      </p:sp>
+      <p:sp>
+        <p:nvSpPr>
+          <p:cNvPr name="TextBox 2" id="3"/>
+          <p:cNvSpPr txBox="true"/>
+          <p:nvPr/>
+        </p:nvSpPr>
+        <p:spPr>
+          <a:xfrm>
+            <a:off x="254000" y="571500"/>
+            <a:ext cx="7620000" cy="317500"/>
+          </a:xfrm>
+          <a:prstGeom prst="rect">
+            <a:avLst/>
+          </a:prstGeom>
+        </p:spPr>
+        <p:txBody>
+          <a:bodyPr anchor="t" rtlCol="false"/>
+          <a:lstStyle/>
+          <a:p>
+            <a:pPr algn="l"/>
+            <a:r>
+              <a:t/>
+            </a:r>
+            <a:endParaRPr lang="en-US" sz="1100"/>
+          </a:p>
+          <a:p>
+            <a:r>
+              <a:rPr lang="en-US" sz="2400">
+                <a:solidFill>
+                  <a:srgbClr val="0000FF"/>
+                </a:solidFill>
+              </a:rPr>
+              <a:t>nobleTitle:Princess</a:t>
+            </a:r>
+          </a:p>
+        </p:txBody>
+      </p:sp>
+      <p:sp>
+        <p:nvSpPr>
+          <p:cNvPr name="TextBox 3" id="4"/>
+          <p:cNvSpPr txBox="true"/>
+          <p:nvPr/>
+        </p:nvSpPr>
+        <p:spPr>
+          <a:xfrm>
+            <a:off x="254000" y="889000"/>
+            <a:ext cx="7620000" cy="317500"/>
+          </a:xfrm>
+          <a:prstGeom prst="rect">
+            <a:avLst/>
+          </a:prstGeom>
+        </p:spPr>
+        <p:txBody>
+          <a:bodyPr anchor="t" rtlCol="false"/>
+          <a:lstStyle/>
+          <a:p>
+            <a:pPr algn="l"/>
+            <a:r>
+              <a:t/>
+            </a:r>
+            <a:endParaRPr lang="en-US" sz="1100"/>
+          </a:p>
+          <a:p>
+            <a:r>
+              <a:rPr lang="en-US" sz="2400">
+                <a:solidFill>
+                  <a:srgbClr val="0000FF"/>
+                </a:solidFill>
+              </a:rPr>
+              <a:t>sex:female</a:t>
+            </a:r>
+          </a:p>
+        </p:txBody>
+      </p:sp>
+      <p:sp>
+        <p:nvSpPr>
+          <p:cNvPr name="TextBox 4" id="5"/>
+          <p:cNvSpPr txBox="true"/>
+          <p:nvPr/>
+        </p:nvSpPr>
+        <p:spPr>
+          <a:xfrm>
+            <a:off x="254000" y="1206500"/>
+            <a:ext cx="7620000" cy="317500"/>
+          </a:xfrm>
+          <a:prstGeom prst="rect">
+            <a:avLst/>
+          </a:prstGeom>
+        </p:spPr>
+        <p:txBody>
+          <a:bodyPr anchor="t" rtlCol="false"/>
+          <a:lstStyle/>
+          <a:p>
+            <a:pPr algn="l"/>
+            <a:r>
+              <a:t/>
+            </a:r>
+            <a:endParaRPr lang="en-US" sz="1100"/>
+          </a:p>
+          <a:p>
+            <a:r>
+              <a:rPr lang="en-US" sz="2400">
+                <a:solidFill>
+                  <a:srgbClr val="0000FF"/>
+                </a:solidFill>
+              </a:rPr>
+              <a:t>yearBorn:1843</a:t>
+            </a:r>
+          </a:p>
+        </p:txBody>
+      </p:sp>
+      <p:sp>
+        <p:nvSpPr>
+          <p:cNvPr name="TextBox 5" id="6"/>
+          <p:cNvSpPr txBox="true"/>
+          <p:nvPr/>
+        </p:nvSpPr>
+        <p:spPr>
+          <a:xfrm>
+            <a:off x="254000" y="1524000"/>
+            <a:ext cx="7620000" cy="317500"/>
+          </a:xfrm>
+          <a:prstGeom prst="rect">
+            <a:avLst/>
+          </a:prstGeom>
+        </p:spPr>
+        <p:txBody>
+          <a:bodyPr anchor="t" rtlCol="false"/>
+          <a:lstStyle/>
+          <a:p>
+            <a:pPr algn="l"/>
+            <a:r>
+              <a:t/>
+            </a:r>
+            <a:endParaRPr lang="en-US" sz="1100"/>
+          </a:p>
+          <a:p>
+            <a:r>
+              <a:rPr lang="en-US" sz="2400">
+                <a:solidFill>
+                  <a:srgbClr val="0000FF"/>
+                </a:solidFill>
+              </a:rPr>
+              <a:t>birthPlace:Buckingham,Palace,London,England</a:t>
+            </a:r>
+          </a:p>
+        </p:txBody>
+      </p:sp>
+      <p:sp>
+        <p:nvSpPr>
+          <p:cNvPr name="TextBox 6" id="7"/>
+          <p:cNvSpPr txBox="true"/>
+          <p:nvPr/>
+        </p:nvSpPr>
+        <p:spPr>
+          <a:xfrm>
+            <a:off x="254000" y="1841500"/>
+            <a:ext cx="7620000" cy="317500"/>
+          </a:xfrm>
+          <a:prstGeom prst="rect">
+            <a:avLst/>
+          </a:prstGeom>
+        </p:spPr>
+        <p:txBody>
+          <a:bodyPr anchor="t" rtlCol="false"/>
+          <a:lstStyle/>
+          <a:p>
+            <a:pPr algn="l"/>
+            <a:r>
+              <a:t/>
+            </a:r>
+            <a:endParaRPr lang="en-US" sz="1100"/>
+          </a:p>
+          <a:p>
+            <a:r>
+              <a:rPr lang="en-US" sz="2400">
+                <a:solidFill>
+                  <a:srgbClr val="0000FF"/>
+                </a:solidFill>
+              </a:rPr>
+              <a:t>yearDied:1878</a:t>
+            </a:r>
+          </a:p>
+        </p:txBody>
+      </p:sp>
+      <p:sp>
+        <p:nvSpPr>
+          <p:cNvPr name="TextBox 7" id="8"/>
+          <p:cNvSpPr txBox="true"/>
+          <p:nvPr/>
+        </p:nvSpPr>
+        <p:spPr>
+          <a:xfrm>
+            <a:off x="254000" y="2159000"/>
+            <a:ext cx="7620000" cy="317500"/>
+          </a:xfrm>
+          <a:prstGeom prst="rect">
+            <a:avLst/>
+          </a:prstGeom>
+        </p:spPr>
+        <p:txBody>
+          <a:bodyPr anchor="t" rtlCol="false"/>
+          <a:lstStyle/>
+          <a:p>
+            <a:pPr algn="l"/>
+            <a:r>
+              <a:t/>
+            </a:r>
+            <a:endParaRPr lang="en-US" sz="1100"/>
+          </a:p>
+          <a:p>
+            <a:r>
+              <a:rPr lang="en-US" sz="2400">
+                <a:solidFill>
+                  <a:srgbClr val="0000FF"/>
+                </a:solidFill>
+              </a:rPr>
+              <a:t>diedAt:Darmstadt,,,Germany</a:t>
             </a:r>
           </a:p>
         </p:txBody>
@@ -3387,30 +4497,252 @@
         <p:spPr>
           <a:xfrm>
             <a:off x="254000" y="254000"/>
-            <a:ext cx="2540000" cy="2540000"/>
-          </a:xfrm>
-          <a:prstGeom prst="rect">
-            <a:avLst/>
-          </a:prstGeom>
-        </p:spPr>
-        <p:txBody>
-          <a:bodyPr anchor="t" rtlCol="false"/>
-          <a:lstStyle/>
-          <a:p>
-            <a:pPr algn="l"/>
-            <a:r>
-              <a:t/>
-            </a:r>
-            <a:endParaRPr lang="en-US" sz="1100"/>
-          </a:p>
-          <a:p>
-            <a:r>
-              <a:rPr lang="en-US" sz="2400">
-                <a:solidFill>
-                  <a:srgbClr val="0000FF"/>
-                </a:solidFill>
-              </a:rPr>
-              <a:t>Alfred Ernest Albert</a:t>
+            <a:ext cx="7620000" cy="317500"/>
+          </a:xfrm>
+          <a:prstGeom prst="rect">
+            <a:avLst/>
+          </a:prstGeom>
+        </p:spPr>
+        <p:txBody>
+          <a:bodyPr anchor="t" rtlCol="false"/>
+          <a:lstStyle/>
+          <a:p>
+            <a:pPr algn="l"/>
+            <a:r>
+              <a:t/>
+            </a:r>
+            <a:endParaRPr lang="en-US" sz="1100"/>
+          </a:p>
+          <a:p>
+            <a:r>
+              <a:rPr lang="en-US" sz="2400">
+                <a:solidFill>
+                  <a:srgbClr val="0000FF"/>
+                </a:solidFill>
+              </a:rPr>
+              <a:t>name:Alfred Ernest Albert</a:t>
+            </a:r>
+          </a:p>
+        </p:txBody>
+      </p:sp>
+      <p:sp>
+        <p:nvSpPr>
+          <p:cNvPr name="TextBox 2" id="3"/>
+          <p:cNvSpPr txBox="true"/>
+          <p:nvPr/>
+        </p:nvSpPr>
+        <p:spPr>
+          <a:xfrm>
+            <a:off x="254000" y="571500"/>
+            <a:ext cx="7620000" cy="317500"/>
+          </a:xfrm>
+          <a:prstGeom prst="rect">
+            <a:avLst/>
+          </a:prstGeom>
+        </p:spPr>
+        <p:txBody>
+          <a:bodyPr anchor="t" rtlCol="false"/>
+          <a:lstStyle/>
+          <a:p>
+            <a:pPr algn="l"/>
+            <a:r>
+              <a:t/>
+            </a:r>
+            <a:endParaRPr lang="en-US" sz="1100"/>
+          </a:p>
+          <a:p>
+            <a:r>
+              <a:rPr lang="en-US" sz="2400">
+                <a:solidFill>
+                  <a:srgbClr val="0000FF"/>
+                </a:solidFill>
+              </a:rPr>
+              <a:t>nobleTitle:Prince</a:t>
+            </a:r>
+          </a:p>
+        </p:txBody>
+      </p:sp>
+      <p:sp>
+        <p:nvSpPr>
+          <p:cNvPr name="TextBox 3" id="4"/>
+          <p:cNvSpPr txBox="true"/>
+          <p:nvPr/>
+        </p:nvSpPr>
+        <p:spPr>
+          <a:xfrm>
+            <a:off x="254000" y="889000"/>
+            <a:ext cx="7620000" cy="317500"/>
+          </a:xfrm>
+          <a:prstGeom prst="rect">
+            <a:avLst/>
+          </a:prstGeom>
+        </p:spPr>
+        <p:txBody>
+          <a:bodyPr anchor="t" rtlCol="false"/>
+          <a:lstStyle/>
+          <a:p>
+            <a:pPr algn="l"/>
+            <a:r>
+              <a:t/>
+            </a:r>
+            <a:endParaRPr lang="en-US" sz="1100"/>
+          </a:p>
+          <a:p>
+            <a:r>
+              <a:rPr lang="en-US" sz="2400">
+                <a:solidFill>
+                  <a:srgbClr val="0000FF"/>
+                </a:solidFill>
+              </a:rPr>
+              <a:t>sex:male</a:t>
+            </a:r>
+          </a:p>
+        </p:txBody>
+      </p:sp>
+      <p:sp>
+        <p:nvSpPr>
+          <p:cNvPr name="TextBox 4" id="5"/>
+          <p:cNvSpPr txBox="true"/>
+          <p:nvPr/>
+        </p:nvSpPr>
+        <p:spPr>
+          <a:xfrm>
+            <a:off x="254000" y="1206500"/>
+            <a:ext cx="7620000" cy="317500"/>
+          </a:xfrm>
+          <a:prstGeom prst="rect">
+            <a:avLst/>
+          </a:prstGeom>
+        </p:spPr>
+        <p:txBody>
+          <a:bodyPr anchor="t" rtlCol="false"/>
+          <a:lstStyle/>
+          <a:p>
+            <a:pPr algn="l"/>
+            <a:r>
+              <a:t/>
+            </a:r>
+            <a:endParaRPr lang="en-US" sz="1100"/>
+          </a:p>
+          <a:p>
+            <a:r>
+              <a:rPr lang="en-US" sz="2400">
+                <a:solidFill>
+                  <a:srgbClr val="0000FF"/>
+                </a:solidFill>
+              </a:rPr>
+              <a:t>yearBorn:1844</a:t>
+            </a:r>
+          </a:p>
+        </p:txBody>
+      </p:sp>
+      <p:sp>
+        <p:nvSpPr>
+          <p:cNvPr name="TextBox 5" id="6"/>
+          <p:cNvSpPr txBox="true"/>
+          <p:nvPr/>
+        </p:nvSpPr>
+        <p:spPr>
+          <a:xfrm>
+            <a:off x="254000" y="1524000"/>
+            <a:ext cx="7620000" cy="317500"/>
+          </a:xfrm>
+          <a:prstGeom prst="rect">
+            <a:avLst/>
+          </a:prstGeom>
+        </p:spPr>
+        <p:txBody>
+          <a:bodyPr anchor="t" rtlCol="false"/>
+          <a:lstStyle/>
+          <a:p>
+            <a:pPr algn="l"/>
+            <a:r>
+              <a:t/>
+            </a:r>
+            <a:endParaRPr lang="en-US" sz="1100"/>
+          </a:p>
+          <a:p>
+            <a:r>
+              <a:rPr lang="en-US" sz="2400">
+                <a:solidFill>
+                  <a:srgbClr val="0000FF"/>
+                </a:solidFill>
+              </a:rPr>
+              <a:t>birthPlace:Windsor Castle,Berkshire,England</a:t>
+            </a:r>
+          </a:p>
+        </p:txBody>
+      </p:sp>
+      <p:sp>
+        <p:nvSpPr>
+          <p:cNvPr name="TextBox 6" id="7"/>
+          <p:cNvSpPr txBox="true"/>
+          <p:nvPr/>
+        </p:nvSpPr>
+        <p:spPr>
+          <a:xfrm>
+            <a:off x="254000" y="1841500"/>
+            <a:ext cx="7620000" cy="317500"/>
+          </a:xfrm>
+          <a:prstGeom prst="rect">
+            <a:avLst/>
+          </a:prstGeom>
+        </p:spPr>
+        <p:txBody>
+          <a:bodyPr anchor="t" rtlCol="false"/>
+          <a:lstStyle/>
+          <a:p>
+            <a:pPr algn="l"/>
+            <a:r>
+              <a:t/>
+            </a:r>
+            <a:endParaRPr lang="en-US" sz="1100"/>
+          </a:p>
+          <a:p>
+            <a:r>
+              <a:rPr lang="en-US" sz="2400">
+                <a:solidFill>
+                  <a:srgbClr val="0000FF"/>
+                </a:solidFill>
+              </a:rPr>
+              <a:t>yearDied:1900</a:t>
+            </a:r>
+          </a:p>
+        </p:txBody>
+      </p:sp>
+      <p:sp>
+        <p:nvSpPr>
+          <p:cNvPr name="TextBox 7" id="8"/>
+          <p:cNvSpPr txBox="true"/>
+          <p:nvPr/>
+        </p:nvSpPr>
+        <p:spPr>
+          <a:xfrm>
+            <a:off x="254000" y="2159000"/>
+            <a:ext cx="7620000" cy="317500"/>
+          </a:xfrm>
+          <a:prstGeom prst="rect">
+            <a:avLst/>
+          </a:prstGeom>
+        </p:spPr>
+        <p:txBody>
+          <a:bodyPr anchor="t" rtlCol="false"/>
+          <a:lstStyle/>
+          <a:p>
+            <a:pPr algn="l"/>
+            <a:r>
+              <a:t/>
+            </a:r>
+            <a:endParaRPr lang="en-US" sz="1100"/>
+          </a:p>
+          <a:p>
+            <a:r>
+              <a:rPr lang="en-US" sz="2400">
+                <a:solidFill>
+                  <a:srgbClr val="0000FF"/>
+                </a:solidFill>
+              </a:rPr>
+              <a:t>diedAt:Schloss Rosenau,Near Coburg</a:t>
             </a:r>
           </a:p>
         </p:txBody>
@@ -3449,30 +4781,252 @@
         <p:spPr>
           <a:xfrm>
             <a:off x="254000" y="254000"/>
-            <a:ext cx="2540000" cy="2540000"/>
-          </a:xfrm>
-          <a:prstGeom prst="rect">
-            <a:avLst/>
-          </a:prstGeom>
-        </p:spPr>
-        <p:txBody>
-          <a:bodyPr anchor="t" rtlCol="false"/>
-          <a:lstStyle/>
-          <a:p>
-            <a:pPr algn="l"/>
-            <a:r>
-              <a:t/>
-            </a:r>
-            <a:endParaRPr lang="en-US" sz="1100"/>
-          </a:p>
-          <a:p>
-            <a:r>
-              <a:rPr lang="en-US" sz="2400">
-                <a:solidFill>
-                  <a:srgbClr val="0000FF"/>
-                </a:solidFill>
-              </a:rPr>
-              <a:t>Helena Augusta Victoria</a:t>
+            <a:ext cx="7620000" cy="317500"/>
+          </a:xfrm>
+          <a:prstGeom prst="rect">
+            <a:avLst/>
+          </a:prstGeom>
+        </p:spPr>
+        <p:txBody>
+          <a:bodyPr anchor="t" rtlCol="false"/>
+          <a:lstStyle/>
+          <a:p>
+            <a:pPr algn="l"/>
+            <a:r>
+              <a:t/>
+            </a:r>
+            <a:endParaRPr lang="en-US" sz="1100"/>
+          </a:p>
+          <a:p>
+            <a:r>
+              <a:rPr lang="en-US" sz="2400">
+                <a:solidFill>
+                  <a:srgbClr val="0000FF"/>
+                </a:solidFill>
+              </a:rPr>
+              <a:t>name:Helena Augusta Victoria</a:t>
+            </a:r>
+          </a:p>
+        </p:txBody>
+      </p:sp>
+      <p:sp>
+        <p:nvSpPr>
+          <p:cNvPr name="TextBox 2" id="3"/>
+          <p:cNvSpPr txBox="true"/>
+          <p:nvPr/>
+        </p:nvSpPr>
+        <p:spPr>
+          <a:xfrm>
+            <a:off x="254000" y="571500"/>
+            <a:ext cx="7620000" cy="317500"/>
+          </a:xfrm>
+          <a:prstGeom prst="rect">
+            <a:avLst/>
+          </a:prstGeom>
+        </p:spPr>
+        <p:txBody>
+          <a:bodyPr anchor="t" rtlCol="false"/>
+          <a:lstStyle/>
+          <a:p>
+            <a:pPr algn="l"/>
+            <a:r>
+              <a:t/>
+            </a:r>
+            <a:endParaRPr lang="en-US" sz="1100"/>
+          </a:p>
+          <a:p>
+            <a:r>
+              <a:rPr lang="en-US" sz="2400">
+                <a:solidFill>
+                  <a:srgbClr val="0000FF"/>
+                </a:solidFill>
+              </a:rPr>
+              <a:t>nobleTitle:Princess</a:t>
+            </a:r>
+          </a:p>
+        </p:txBody>
+      </p:sp>
+      <p:sp>
+        <p:nvSpPr>
+          <p:cNvPr name="TextBox 3" id="4"/>
+          <p:cNvSpPr txBox="true"/>
+          <p:nvPr/>
+        </p:nvSpPr>
+        <p:spPr>
+          <a:xfrm>
+            <a:off x="254000" y="889000"/>
+            <a:ext cx="7620000" cy="317500"/>
+          </a:xfrm>
+          <a:prstGeom prst="rect">
+            <a:avLst/>
+          </a:prstGeom>
+        </p:spPr>
+        <p:txBody>
+          <a:bodyPr anchor="t" rtlCol="false"/>
+          <a:lstStyle/>
+          <a:p>
+            <a:pPr algn="l"/>
+            <a:r>
+              <a:t/>
+            </a:r>
+            <a:endParaRPr lang="en-US" sz="1100"/>
+          </a:p>
+          <a:p>
+            <a:r>
+              <a:rPr lang="en-US" sz="2400">
+                <a:solidFill>
+                  <a:srgbClr val="0000FF"/>
+                </a:solidFill>
+              </a:rPr>
+              <a:t>sex:female</a:t>
+            </a:r>
+          </a:p>
+        </p:txBody>
+      </p:sp>
+      <p:sp>
+        <p:nvSpPr>
+          <p:cNvPr name="TextBox 4" id="5"/>
+          <p:cNvSpPr txBox="true"/>
+          <p:nvPr/>
+        </p:nvSpPr>
+        <p:spPr>
+          <a:xfrm>
+            <a:off x="254000" y="1206500"/>
+            <a:ext cx="7620000" cy="317500"/>
+          </a:xfrm>
+          <a:prstGeom prst="rect">
+            <a:avLst/>
+          </a:prstGeom>
+        </p:spPr>
+        <p:txBody>
+          <a:bodyPr anchor="t" rtlCol="false"/>
+          <a:lstStyle/>
+          <a:p>
+            <a:pPr algn="l"/>
+            <a:r>
+              <a:t/>
+            </a:r>
+            <a:endParaRPr lang="en-US" sz="1100"/>
+          </a:p>
+          <a:p>
+            <a:r>
+              <a:rPr lang="en-US" sz="2400">
+                <a:solidFill>
+                  <a:srgbClr val="0000FF"/>
+                </a:solidFill>
+              </a:rPr>
+              <a:t>yearBorn:1846</a:t>
+            </a:r>
+          </a:p>
+        </p:txBody>
+      </p:sp>
+      <p:sp>
+        <p:nvSpPr>
+          <p:cNvPr name="TextBox 5" id="6"/>
+          <p:cNvSpPr txBox="true"/>
+          <p:nvPr/>
+        </p:nvSpPr>
+        <p:spPr>
+          <a:xfrm>
+            <a:off x="254000" y="1524000"/>
+            <a:ext cx="7620000" cy="317500"/>
+          </a:xfrm>
+          <a:prstGeom prst="rect">
+            <a:avLst/>
+          </a:prstGeom>
+        </p:spPr>
+        <p:txBody>
+          <a:bodyPr anchor="t" rtlCol="false"/>
+          <a:lstStyle/>
+          <a:p>
+            <a:pPr algn="l"/>
+            <a:r>
+              <a:t/>
+            </a:r>
+            <a:endParaRPr lang="en-US" sz="1100"/>
+          </a:p>
+          <a:p>
+            <a:r>
+              <a:rPr lang="en-US" sz="2400">
+                <a:solidFill>
+                  <a:srgbClr val="0000FF"/>
+                </a:solidFill>
+              </a:rPr>
+              <a:t>birthPlace:Buckingham,Palace,London,England</a:t>
+            </a:r>
+          </a:p>
+        </p:txBody>
+      </p:sp>
+      <p:sp>
+        <p:nvSpPr>
+          <p:cNvPr name="TextBox 6" id="7"/>
+          <p:cNvSpPr txBox="true"/>
+          <p:nvPr/>
+        </p:nvSpPr>
+        <p:spPr>
+          <a:xfrm>
+            <a:off x="254000" y="1841500"/>
+            <a:ext cx="7620000" cy="317500"/>
+          </a:xfrm>
+          <a:prstGeom prst="rect">
+            <a:avLst/>
+          </a:prstGeom>
+        </p:spPr>
+        <p:txBody>
+          <a:bodyPr anchor="t" rtlCol="false"/>
+          <a:lstStyle/>
+          <a:p>
+            <a:pPr algn="l"/>
+            <a:r>
+              <a:t/>
+            </a:r>
+            <a:endParaRPr lang="en-US" sz="1100"/>
+          </a:p>
+          <a:p>
+            <a:r>
+              <a:rPr lang="en-US" sz="2400">
+                <a:solidFill>
+                  <a:srgbClr val="0000FF"/>
+                </a:solidFill>
+              </a:rPr>
+              <a:t>yearDied:1923</a:t>
+            </a:r>
+          </a:p>
+        </p:txBody>
+      </p:sp>
+      <p:sp>
+        <p:nvSpPr>
+          <p:cNvPr name="TextBox 7" id="8"/>
+          <p:cNvSpPr txBox="true"/>
+          <p:nvPr/>
+        </p:nvSpPr>
+        <p:spPr>
+          <a:xfrm>
+            <a:off x="254000" y="2159000"/>
+            <a:ext cx="7620000" cy="317500"/>
+          </a:xfrm>
+          <a:prstGeom prst="rect">
+            <a:avLst/>
+          </a:prstGeom>
+        </p:spPr>
+        <p:txBody>
+          <a:bodyPr anchor="t" rtlCol="false"/>
+          <a:lstStyle/>
+          <a:p>
+            <a:pPr algn="l"/>
+            <a:r>
+              <a:t/>
+            </a:r>
+            <a:endParaRPr lang="en-US" sz="1100"/>
+          </a:p>
+          <a:p>
+            <a:r>
+              <a:rPr lang="en-US" sz="2400">
+                <a:solidFill>
+                  <a:srgbClr val="0000FF"/>
+                </a:solidFill>
+              </a:rPr>
+              <a:t>diedAt:Schomberg House,Pall Mall,London,England</a:t>
             </a:r>
           </a:p>
         </p:txBody>
@@ -3511,30 +5065,252 @@
         <p:spPr>
           <a:xfrm>
             <a:off x="254000" y="254000"/>
-            <a:ext cx="2540000" cy="2540000"/>
-          </a:xfrm>
-          <a:prstGeom prst="rect">
-            <a:avLst/>
-          </a:prstGeom>
-        </p:spPr>
-        <p:txBody>
-          <a:bodyPr anchor="t" rtlCol="false"/>
-          <a:lstStyle/>
-          <a:p>
-            <a:pPr algn="l"/>
-            <a:r>
-              <a:t/>
-            </a:r>
-            <a:endParaRPr lang="en-US" sz="1100"/>
-          </a:p>
-          <a:p>
-            <a:r>
-              <a:rPr lang="en-US" sz="2400">
-                <a:solidFill>
-                  <a:srgbClr val="0000FF"/>
-                </a:solidFill>
-              </a:rPr>
-              <a:t>Louise Caroline Alberta</a:t>
+            <a:ext cx="7620000" cy="317500"/>
+          </a:xfrm>
+          <a:prstGeom prst="rect">
+            <a:avLst/>
+          </a:prstGeom>
+        </p:spPr>
+        <p:txBody>
+          <a:bodyPr anchor="t" rtlCol="false"/>
+          <a:lstStyle/>
+          <a:p>
+            <a:pPr algn="l"/>
+            <a:r>
+              <a:t/>
+            </a:r>
+            <a:endParaRPr lang="en-US" sz="1100"/>
+          </a:p>
+          <a:p>
+            <a:r>
+              <a:rPr lang="en-US" sz="2400">
+                <a:solidFill>
+                  <a:srgbClr val="0000FF"/>
+                </a:solidFill>
+              </a:rPr>
+              <a:t>name:Louise Caroline Alberta</a:t>
+            </a:r>
+          </a:p>
+        </p:txBody>
+      </p:sp>
+      <p:sp>
+        <p:nvSpPr>
+          <p:cNvPr name="TextBox 2" id="3"/>
+          <p:cNvSpPr txBox="true"/>
+          <p:nvPr/>
+        </p:nvSpPr>
+        <p:spPr>
+          <a:xfrm>
+            <a:off x="254000" y="571500"/>
+            <a:ext cx="7620000" cy="317500"/>
+          </a:xfrm>
+          <a:prstGeom prst="rect">
+            <a:avLst/>
+          </a:prstGeom>
+        </p:spPr>
+        <p:txBody>
+          <a:bodyPr anchor="t" rtlCol="false"/>
+          <a:lstStyle/>
+          <a:p>
+            <a:pPr algn="l"/>
+            <a:r>
+              <a:t/>
+            </a:r>
+            <a:endParaRPr lang="en-US" sz="1100"/>
+          </a:p>
+          <a:p>
+            <a:r>
+              <a:rPr lang="en-US" sz="2400">
+                <a:solidFill>
+                  <a:srgbClr val="0000FF"/>
+                </a:solidFill>
+              </a:rPr>
+              <a:t>nobleTitle:Princess</a:t>
+            </a:r>
+          </a:p>
+        </p:txBody>
+      </p:sp>
+      <p:sp>
+        <p:nvSpPr>
+          <p:cNvPr name="TextBox 3" id="4"/>
+          <p:cNvSpPr txBox="true"/>
+          <p:nvPr/>
+        </p:nvSpPr>
+        <p:spPr>
+          <a:xfrm>
+            <a:off x="254000" y="889000"/>
+            <a:ext cx="7620000" cy="317500"/>
+          </a:xfrm>
+          <a:prstGeom prst="rect">
+            <a:avLst/>
+          </a:prstGeom>
+        </p:spPr>
+        <p:txBody>
+          <a:bodyPr anchor="t" rtlCol="false"/>
+          <a:lstStyle/>
+          <a:p>
+            <a:pPr algn="l"/>
+            <a:r>
+              <a:t/>
+            </a:r>
+            <a:endParaRPr lang="en-US" sz="1100"/>
+          </a:p>
+          <a:p>
+            <a:r>
+              <a:rPr lang="en-US" sz="2400">
+                <a:solidFill>
+                  <a:srgbClr val="0000FF"/>
+                </a:solidFill>
+              </a:rPr>
+              <a:t>sex:female</a:t>
+            </a:r>
+          </a:p>
+        </p:txBody>
+      </p:sp>
+      <p:sp>
+        <p:nvSpPr>
+          <p:cNvPr name="TextBox 4" id="5"/>
+          <p:cNvSpPr txBox="true"/>
+          <p:nvPr/>
+        </p:nvSpPr>
+        <p:spPr>
+          <a:xfrm>
+            <a:off x="254000" y="1206500"/>
+            <a:ext cx="7620000" cy="317500"/>
+          </a:xfrm>
+          <a:prstGeom prst="rect">
+            <a:avLst/>
+          </a:prstGeom>
+        </p:spPr>
+        <p:txBody>
+          <a:bodyPr anchor="t" rtlCol="false"/>
+          <a:lstStyle/>
+          <a:p>
+            <a:pPr algn="l"/>
+            <a:r>
+              <a:t/>
+            </a:r>
+            <a:endParaRPr lang="en-US" sz="1100"/>
+          </a:p>
+          <a:p>
+            <a:r>
+              <a:rPr lang="en-US" sz="2400">
+                <a:solidFill>
+                  <a:srgbClr val="0000FF"/>
+                </a:solidFill>
+              </a:rPr>
+              <a:t>yearBorn:1848</a:t>
+            </a:r>
+          </a:p>
+        </p:txBody>
+      </p:sp>
+      <p:sp>
+        <p:nvSpPr>
+          <p:cNvPr name="TextBox 5" id="6"/>
+          <p:cNvSpPr txBox="true"/>
+          <p:nvPr/>
+        </p:nvSpPr>
+        <p:spPr>
+          <a:xfrm>
+            <a:off x="254000" y="1524000"/>
+            <a:ext cx="7620000" cy="317500"/>
+          </a:xfrm>
+          <a:prstGeom prst="rect">
+            <a:avLst/>
+          </a:prstGeom>
+        </p:spPr>
+        <p:txBody>
+          <a:bodyPr anchor="t" rtlCol="false"/>
+          <a:lstStyle/>
+          <a:p>
+            <a:pPr algn="l"/>
+            <a:r>
+              <a:t/>
+            </a:r>
+            <a:endParaRPr lang="en-US" sz="1100"/>
+          </a:p>
+          <a:p>
+            <a:r>
+              <a:rPr lang="en-US" sz="2400">
+                <a:solidFill>
+                  <a:srgbClr val="0000FF"/>
+                </a:solidFill>
+              </a:rPr>
+              <a:t>birthPlace:Buckingham,Palace,London,England</a:t>
+            </a:r>
+          </a:p>
+        </p:txBody>
+      </p:sp>
+      <p:sp>
+        <p:nvSpPr>
+          <p:cNvPr name="TextBox 6" id="7"/>
+          <p:cNvSpPr txBox="true"/>
+          <p:nvPr/>
+        </p:nvSpPr>
+        <p:spPr>
+          <a:xfrm>
+            <a:off x="254000" y="1841500"/>
+            <a:ext cx="7620000" cy="317500"/>
+          </a:xfrm>
+          <a:prstGeom prst="rect">
+            <a:avLst/>
+          </a:prstGeom>
+        </p:spPr>
+        <p:txBody>
+          <a:bodyPr anchor="t" rtlCol="false"/>
+          <a:lstStyle/>
+          <a:p>
+            <a:pPr algn="l"/>
+            <a:r>
+              <a:t/>
+            </a:r>
+            <a:endParaRPr lang="en-US" sz="1100"/>
+          </a:p>
+          <a:p>
+            <a:r>
+              <a:rPr lang="en-US" sz="2400">
+                <a:solidFill>
+                  <a:srgbClr val="0000FF"/>
+                </a:solidFill>
+              </a:rPr>
+              <a:t>yearDied:1939</a:t>
+            </a:r>
+          </a:p>
+        </p:txBody>
+      </p:sp>
+      <p:sp>
+        <p:nvSpPr>
+          <p:cNvPr name="TextBox 7" id="8"/>
+          <p:cNvSpPr txBox="true"/>
+          <p:nvPr/>
+        </p:nvSpPr>
+        <p:spPr>
+          <a:xfrm>
+            <a:off x="254000" y="2159000"/>
+            <a:ext cx="7620000" cy="317500"/>
+          </a:xfrm>
+          <a:prstGeom prst="rect">
+            <a:avLst/>
+          </a:prstGeom>
+        </p:spPr>
+        <p:txBody>
+          <a:bodyPr anchor="t" rtlCol="false"/>
+          <a:lstStyle/>
+          <a:p>
+            <a:pPr algn="l"/>
+            <a:r>
+              <a:t/>
+            </a:r>
+            <a:endParaRPr lang="en-US" sz="1100"/>
+          </a:p>
+          <a:p>
+            <a:r>
+              <a:rPr lang="en-US" sz="2400">
+                <a:solidFill>
+                  <a:srgbClr val="0000FF"/>
+                </a:solidFill>
+              </a:rPr>
+              <a:t>diedAt:Frogmore,,,England</a:t>
             </a:r>
           </a:p>
         </p:txBody>
@@ -3573,30 +5349,252 @@
         <p:spPr>
           <a:xfrm>
             <a:off x="254000" y="254000"/>
-            <a:ext cx="2540000" cy="2540000"/>
-          </a:xfrm>
-          <a:prstGeom prst="rect">
-            <a:avLst/>
-          </a:prstGeom>
-        </p:spPr>
-        <p:txBody>
-          <a:bodyPr anchor="t" rtlCol="false"/>
-          <a:lstStyle/>
-          <a:p>
-            <a:pPr algn="l"/>
-            <a:r>
-              <a:t/>
-            </a:r>
-            <a:endParaRPr lang="en-US" sz="1100"/>
-          </a:p>
-          <a:p>
-            <a:r>
-              <a:rPr lang="en-US" sz="2400">
-                <a:solidFill>
-                  <a:srgbClr val="0000FF"/>
-                </a:solidFill>
-              </a:rPr>
-              <a:t>Arthur William Patrick</a:t>
+            <a:ext cx="7620000" cy="317500"/>
+          </a:xfrm>
+          <a:prstGeom prst="rect">
+            <a:avLst/>
+          </a:prstGeom>
+        </p:spPr>
+        <p:txBody>
+          <a:bodyPr anchor="t" rtlCol="false"/>
+          <a:lstStyle/>
+          <a:p>
+            <a:pPr algn="l"/>
+            <a:r>
+              <a:t/>
+            </a:r>
+            <a:endParaRPr lang="en-US" sz="1100"/>
+          </a:p>
+          <a:p>
+            <a:r>
+              <a:rPr lang="en-US" sz="2400">
+                <a:solidFill>
+                  <a:srgbClr val="0000FF"/>
+                </a:solidFill>
+              </a:rPr>
+              <a:t>name:Arthur William Patrick</a:t>
+            </a:r>
+          </a:p>
+        </p:txBody>
+      </p:sp>
+      <p:sp>
+        <p:nvSpPr>
+          <p:cNvPr name="TextBox 2" id="3"/>
+          <p:cNvSpPr txBox="true"/>
+          <p:nvPr/>
+        </p:nvSpPr>
+        <p:spPr>
+          <a:xfrm>
+            <a:off x="254000" y="571500"/>
+            <a:ext cx="7620000" cy="317500"/>
+          </a:xfrm>
+          <a:prstGeom prst="rect">
+            <a:avLst/>
+          </a:prstGeom>
+        </p:spPr>
+        <p:txBody>
+          <a:bodyPr anchor="t" rtlCol="false"/>
+          <a:lstStyle/>
+          <a:p>
+            <a:pPr algn="l"/>
+            <a:r>
+              <a:t/>
+            </a:r>
+            <a:endParaRPr lang="en-US" sz="1100"/>
+          </a:p>
+          <a:p>
+            <a:r>
+              <a:rPr lang="en-US" sz="2400">
+                <a:solidFill>
+                  <a:srgbClr val="0000FF"/>
+                </a:solidFill>
+              </a:rPr>
+              <a:t>nobleTitle:Prince</a:t>
+            </a:r>
+          </a:p>
+        </p:txBody>
+      </p:sp>
+      <p:sp>
+        <p:nvSpPr>
+          <p:cNvPr name="TextBox 3" id="4"/>
+          <p:cNvSpPr txBox="true"/>
+          <p:nvPr/>
+        </p:nvSpPr>
+        <p:spPr>
+          <a:xfrm>
+            <a:off x="254000" y="889000"/>
+            <a:ext cx="7620000" cy="317500"/>
+          </a:xfrm>
+          <a:prstGeom prst="rect">
+            <a:avLst/>
+          </a:prstGeom>
+        </p:spPr>
+        <p:txBody>
+          <a:bodyPr anchor="t" rtlCol="false"/>
+          <a:lstStyle/>
+          <a:p>
+            <a:pPr algn="l"/>
+            <a:r>
+              <a:t/>
+            </a:r>
+            <a:endParaRPr lang="en-US" sz="1100"/>
+          </a:p>
+          <a:p>
+            <a:r>
+              <a:rPr lang="en-US" sz="2400">
+                <a:solidFill>
+                  <a:srgbClr val="0000FF"/>
+                </a:solidFill>
+              </a:rPr>
+              <a:t>sex:male</a:t>
+            </a:r>
+          </a:p>
+        </p:txBody>
+      </p:sp>
+      <p:sp>
+        <p:nvSpPr>
+          <p:cNvPr name="TextBox 4" id="5"/>
+          <p:cNvSpPr txBox="true"/>
+          <p:nvPr/>
+        </p:nvSpPr>
+        <p:spPr>
+          <a:xfrm>
+            <a:off x="254000" y="1206500"/>
+            <a:ext cx="7620000" cy="317500"/>
+          </a:xfrm>
+          <a:prstGeom prst="rect">
+            <a:avLst/>
+          </a:prstGeom>
+        </p:spPr>
+        <p:txBody>
+          <a:bodyPr anchor="t" rtlCol="false"/>
+          <a:lstStyle/>
+          <a:p>
+            <a:pPr algn="l"/>
+            <a:r>
+              <a:t/>
+            </a:r>
+            <a:endParaRPr lang="en-US" sz="1100"/>
+          </a:p>
+          <a:p>
+            <a:r>
+              <a:rPr lang="en-US" sz="2400">
+                <a:solidFill>
+                  <a:srgbClr val="0000FF"/>
+                </a:solidFill>
+              </a:rPr>
+              <a:t>yearBorn:1850</a:t>
+            </a:r>
+          </a:p>
+        </p:txBody>
+      </p:sp>
+      <p:sp>
+        <p:nvSpPr>
+          <p:cNvPr name="TextBox 5" id="6"/>
+          <p:cNvSpPr txBox="true"/>
+          <p:nvPr/>
+        </p:nvSpPr>
+        <p:spPr>
+          <a:xfrm>
+            <a:off x="254000" y="1524000"/>
+            <a:ext cx="7620000" cy="317500"/>
+          </a:xfrm>
+          <a:prstGeom prst="rect">
+            <a:avLst/>
+          </a:prstGeom>
+        </p:spPr>
+        <p:txBody>
+          <a:bodyPr anchor="t" rtlCol="false"/>
+          <a:lstStyle/>
+          <a:p>
+            <a:pPr algn="l"/>
+            <a:r>
+              <a:t/>
+            </a:r>
+            <a:endParaRPr lang="en-US" sz="1100"/>
+          </a:p>
+          <a:p>
+            <a:r>
+              <a:rPr lang="en-US" sz="2400">
+                <a:solidFill>
+                  <a:srgbClr val="0000FF"/>
+                </a:solidFill>
+              </a:rPr>
+              <a:t>birthPlace:Buckingham,Palace,London,England</a:t>
+            </a:r>
+          </a:p>
+        </p:txBody>
+      </p:sp>
+      <p:sp>
+        <p:nvSpPr>
+          <p:cNvPr name="TextBox 6" id="7"/>
+          <p:cNvSpPr txBox="true"/>
+          <p:nvPr/>
+        </p:nvSpPr>
+        <p:spPr>
+          <a:xfrm>
+            <a:off x="254000" y="1841500"/>
+            <a:ext cx="7620000" cy="317500"/>
+          </a:xfrm>
+          <a:prstGeom prst="rect">
+            <a:avLst/>
+          </a:prstGeom>
+        </p:spPr>
+        <p:txBody>
+          <a:bodyPr anchor="t" rtlCol="false"/>
+          <a:lstStyle/>
+          <a:p>
+            <a:pPr algn="l"/>
+            <a:r>
+              <a:t/>
+            </a:r>
+            <a:endParaRPr lang="en-US" sz="1100"/>
+          </a:p>
+          <a:p>
+            <a:r>
+              <a:rPr lang="en-US" sz="2400">
+                <a:solidFill>
+                  <a:srgbClr val="0000FF"/>
+                </a:solidFill>
+              </a:rPr>
+              <a:t>yearDied:1942</a:t>
+            </a:r>
+          </a:p>
+        </p:txBody>
+      </p:sp>
+      <p:sp>
+        <p:nvSpPr>
+          <p:cNvPr name="TextBox 7" id="8"/>
+          <p:cNvSpPr txBox="true"/>
+          <p:nvPr/>
+        </p:nvSpPr>
+        <p:spPr>
+          <a:xfrm>
+            <a:off x="254000" y="2159000"/>
+            <a:ext cx="7620000" cy="317500"/>
+          </a:xfrm>
+          <a:prstGeom prst="rect">
+            <a:avLst/>
+          </a:prstGeom>
+        </p:spPr>
+        <p:txBody>
+          <a:bodyPr anchor="t" rtlCol="false"/>
+          <a:lstStyle/>
+          <a:p>
+            <a:pPr algn="l"/>
+            <a:r>
+              <a:t/>
+            </a:r>
+            <a:endParaRPr lang="en-US" sz="1100"/>
+          </a:p>
+          <a:p>
+            <a:r>
+              <a:rPr lang="en-US" sz="2400">
+                <a:solidFill>
+                  <a:srgbClr val="0000FF"/>
+                </a:solidFill>
+              </a:rPr>
+              <a:t>diedAt:Bagshot Park,Surrey</a:t>
             </a:r>
           </a:p>
         </p:txBody>
@@ -3635,30 +5633,252 @@
         <p:spPr>
           <a:xfrm>
             <a:off x="254000" y="254000"/>
-            <a:ext cx="2540000" cy="2540000"/>
-          </a:xfrm>
-          <a:prstGeom prst="rect">
-            <a:avLst/>
-          </a:prstGeom>
-        </p:spPr>
-        <p:txBody>
-          <a:bodyPr anchor="t" rtlCol="false"/>
-          <a:lstStyle/>
-          <a:p>
-            <a:pPr algn="l"/>
-            <a:r>
-              <a:t/>
-            </a:r>
-            <a:endParaRPr lang="en-US" sz="1100"/>
-          </a:p>
-          <a:p>
-            <a:r>
-              <a:rPr lang="en-US" sz="2400">
-                <a:solidFill>
-                  <a:srgbClr val="0000FF"/>
-                </a:solidFill>
-              </a:rPr>
-              <a:t>Leopold George Duncan</a:t>
+            <a:ext cx="7620000" cy="317500"/>
+          </a:xfrm>
+          <a:prstGeom prst="rect">
+            <a:avLst/>
+          </a:prstGeom>
+        </p:spPr>
+        <p:txBody>
+          <a:bodyPr anchor="t" rtlCol="false"/>
+          <a:lstStyle/>
+          <a:p>
+            <a:pPr algn="l"/>
+            <a:r>
+              <a:t/>
+            </a:r>
+            <a:endParaRPr lang="en-US" sz="1100"/>
+          </a:p>
+          <a:p>
+            <a:r>
+              <a:rPr lang="en-US" sz="2400">
+                <a:solidFill>
+                  <a:srgbClr val="0000FF"/>
+                </a:solidFill>
+              </a:rPr>
+              <a:t>name:Leopold George Duncan</a:t>
+            </a:r>
+          </a:p>
+        </p:txBody>
+      </p:sp>
+      <p:sp>
+        <p:nvSpPr>
+          <p:cNvPr name="TextBox 2" id="3"/>
+          <p:cNvSpPr txBox="true"/>
+          <p:nvPr/>
+        </p:nvSpPr>
+        <p:spPr>
+          <a:xfrm>
+            <a:off x="254000" y="571500"/>
+            <a:ext cx="7620000" cy="317500"/>
+          </a:xfrm>
+          <a:prstGeom prst="rect">
+            <a:avLst/>
+          </a:prstGeom>
+        </p:spPr>
+        <p:txBody>
+          <a:bodyPr anchor="t" rtlCol="false"/>
+          <a:lstStyle/>
+          <a:p>
+            <a:pPr algn="l"/>
+            <a:r>
+              <a:t/>
+            </a:r>
+            <a:endParaRPr lang="en-US" sz="1100"/>
+          </a:p>
+          <a:p>
+            <a:r>
+              <a:rPr lang="en-US" sz="2400">
+                <a:solidFill>
+                  <a:srgbClr val="0000FF"/>
+                </a:solidFill>
+              </a:rPr>
+              <a:t>nobleTitle:Prince</a:t>
+            </a:r>
+          </a:p>
+        </p:txBody>
+      </p:sp>
+      <p:sp>
+        <p:nvSpPr>
+          <p:cNvPr name="TextBox 3" id="4"/>
+          <p:cNvSpPr txBox="true"/>
+          <p:nvPr/>
+        </p:nvSpPr>
+        <p:spPr>
+          <a:xfrm>
+            <a:off x="254000" y="889000"/>
+            <a:ext cx="7620000" cy="317500"/>
+          </a:xfrm>
+          <a:prstGeom prst="rect">
+            <a:avLst/>
+          </a:prstGeom>
+        </p:spPr>
+        <p:txBody>
+          <a:bodyPr anchor="t" rtlCol="false"/>
+          <a:lstStyle/>
+          <a:p>
+            <a:pPr algn="l"/>
+            <a:r>
+              <a:t/>
+            </a:r>
+            <a:endParaRPr lang="en-US" sz="1100"/>
+          </a:p>
+          <a:p>
+            <a:r>
+              <a:rPr lang="en-US" sz="2400">
+                <a:solidFill>
+                  <a:srgbClr val="0000FF"/>
+                </a:solidFill>
+              </a:rPr>
+              <a:t>sex:male</a:t>
+            </a:r>
+          </a:p>
+        </p:txBody>
+      </p:sp>
+      <p:sp>
+        <p:nvSpPr>
+          <p:cNvPr name="TextBox 4" id="5"/>
+          <p:cNvSpPr txBox="true"/>
+          <p:nvPr/>
+        </p:nvSpPr>
+        <p:spPr>
+          <a:xfrm>
+            <a:off x="254000" y="1206500"/>
+            <a:ext cx="7620000" cy="317500"/>
+          </a:xfrm>
+          <a:prstGeom prst="rect">
+            <a:avLst/>
+          </a:prstGeom>
+        </p:spPr>
+        <p:txBody>
+          <a:bodyPr anchor="t" rtlCol="false"/>
+          <a:lstStyle/>
+          <a:p>
+            <a:pPr algn="l"/>
+            <a:r>
+              <a:t/>
+            </a:r>
+            <a:endParaRPr lang="en-US" sz="1100"/>
+          </a:p>
+          <a:p>
+            <a:r>
+              <a:rPr lang="en-US" sz="2400">
+                <a:solidFill>
+                  <a:srgbClr val="0000FF"/>
+                </a:solidFill>
+              </a:rPr>
+              <a:t>yearBorn:1853</a:t>
+            </a:r>
+          </a:p>
+        </p:txBody>
+      </p:sp>
+      <p:sp>
+        <p:nvSpPr>
+          <p:cNvPr name="TextBox 5" id="6"/>
+          <p:cNvSpPr txBox="true"/>
+          <p:nvPr/>
+        </p:nvSpPr>
+        <p:spPr>
+          <a:xfrm>
+            <a:off x="254000" y="1524000"/>
+            <a:ext cx="7620000" cy="317500"/>
+          </a:xfrm>
+          <a:prstGeom prst="rect">
+            <a:avLst/>
+          </a:prstGeom>
+        </p:spPr>
+        <p:txBody>
+          <a:bodyPr anchor="t" rtlCol="false"/>
+          <a:lstStyle/>
+          <a:p>
+            <a:pPr algn="l"/>
+            <a:r>
+              <a:t/>
+            </a:r>
+            <a:endParaRPr lang="en-US" sz="1100"/>
+          </a:p>
+          <a:p>
+            <a:r>
+              <a:rPr lang="en-US" sz="2400">
+                <a:solidFill>
+                  <a:srgbClr val="0000FF"/>
+                </a:solidFill>
+              </a:rPr>
+              <a:t>birthPlace:Buckingham,Palace,London,England</a:t>
+            </a:r>
+          </a:p>
+        </p:txBody>
+      </p:sp>
+      <p:sp>
+        <p:nvSpPr>
+          <p:cNvPr name="TextBox 6" id="7"/>
+          <p:cNvSpPr txBox="true"/>
+          <p:nvPr/>
+        </p:nvSpPr>
+        <p:spPr>
+          <a:xfrm>
+            <a:off x="254000" y="1841500"/>
+            <a:ext cx="7620000" cy="317500"/>
+          </a:xfrm>
+          <a:prstGeom prst="rect">
+            <a:avLst/>
+          </a:prstGeom>
+        </p:spPr>
+        <p:txBody>
+          <a:bodyPr anchor="t" rtlCol="false"/>
+          <a:lstStyle/>
+          <a:p>
+            <a:pPr algn="l"/>
+            <a:r>
+              <a:t/>
+            </a:r>
+            <a:endParaRPr lang="en-US" sz="1100"/>
+          </a:p>
+          <a:p>
+            <a:r>
+              <a:rPr lang="en-US" sz="2400">
+                <a:solidFill>
+                  <a:srgbClr val="0000FF"/>
+                </a:solidFill>
+              </a:rPr>
+              <a:t>yearDied:1884</a:t>
+            </a:r>
+          </a:p>
+        </p:txBody>
+      </p:sp>
+      <p:sp>
+        <p:nvSpPr>
+          <p:cNvPr name="TextBox 7" id="8"/>
+          <p:cNvSpPr txBox="true"/>
+          <p:nvPr/>
+        </p:nvSpPr>
+        <p:spPr>
+          <a:xfrm>
+            <a:off x="254000" y="2159000"/>
+            <a:ext cx="7620000" cy="317500"/>
+          </a:xfrm>
+          <a:prstGeom prst="rect">
+            <a:avLst/>
+          </a:prstGeom>
+        </p:spPr>
+        <p:txBody>
+          <a:bodyPr anchor="t" rtlCol="false"/>
+          <a:lstStyle/>
+          <a:p>
+            <a:pPr algn="l"/>
+            <a:r>
+              <a:t/>
+            </a:r>
+            <a:endParaRPr lang="en-US" sz="1100"/>
+          </a:p>
+          <a:p>
+            <a:r>
+              <a:rPr lang="en-US" sz="2400">
+                <a:solidFill>
+                  <a:srgbClr val="0000FF"/>
+                </a:solidFill>
+              </a:rPr>
+              <a:t>diedAt:Cannes</a:t>
             </a:r>
           </a:p>
         </p:txBody>

</xml_diff>

<commit_message>
refactors to add MediaWiki as a System
</commit_message>
<xml_diff>
--- a/QueenVictoria.pptx
+++ b/QueenVictoria.pptx
@@ -9603,6 +9603,80 @@
           </a:p>
         </p:txBody>
       </p:sp>
+      <p:sp>
+        <p:nvSpPr>
+          <p:cNvPr name="TextBox 3" id="4"/>
+          <p:cNvSpPr txBox="true"/>
+          <p:nvPr/>
+        </p:nvSpPr>
+        <p:spPr>
+          <a:xfrm>
+            <a:off x="254000" y="635000"/>
+            <a:ext cx="1905000" cy="381000"/>
+          </a:xfrm>
+          <a:prstGeom prst="rect">
+            <a:avLst/>
+          </a:prstGeom>
+        </p:spPr>
+        <p:txBody>
+          <a:bodyPr anchor="t" rtlCol="false"/>
+          <a:lstStyle/>
+          <a:p>
+            <a:pPr algn="l"/>
+            <a:r>
+              <a:t/>
+            </a:r>
+            <a:endParaRPr lang="en-US" sz="1100"/>
+          </a:p>
+          <a:p>
+            <a:r>
+              <a:rPr lang="en-US" sz="2400">
+                <a:solidFill>
+                  <a:srgbClr val="000000"/>
+                </a:solidFill>
+              </a:rPr>
+              <a:t>image:</a:t>
+            </a:r>
+          </a:p>
+        </p:txBody>
+      </p:sp>
+      <p:sp>
+        <p:nvSpPr>
+          <p:cNvPr name="TextBox 4" id="5"/>
+          <p:cNvSpPr txBox="true"/>
+          <p:nvPr/>
+        </p:nvSpPr>
+        <p:spPr>
+          <a:xfrm>
+            <a:off x="2159000" y="635000"/>
+            <a:ext cx="6350000" cy="381000"/>
+          </a:xfrm>
+          <a:prstGeom prst="rect">
+            <a:avLst/>
+          </a:prstGeom>
+        </p:spPr>
+        <p:txBody>
+          <a:bodyPr anchor="t" rtlCol="false"/>
+          <a:lstStyle/>
+          <a:p>
+            <a:pPr algn="l"/>
+            <a:r>
+              <a:t/>
+            </a:r>
+            <a:endParaRPr lang="en-US" sz="1100"/>
+          </a:p>
+          <a:p>
+            <a:r>
+              <a:rPr lang="en-US" sz="2400">
+                <a:solidFill>
+                  <a:srgbClr val="0000FF"/>
+                </a:solidFill>
+              </a:rPr>
+              <a:t>"Queen Victoria by Bassano.jpg"</a:t>
+            </a:r>
+          </a:p>
+        </p:txBody>
+      </p:sp>
     </p:spTree>
   </p:cSld>
   <p:clrMapOvr>
@@ -9703,6 +9777,80 @@
           </a:p>
         </p:txBody>
       </p:sp>
+      <p:sp>
+        <p:nvSpPr>
+          <p:cNvPr name="TextBox 3" id="4"/>
+          <p:cNvSpPr txBox="true"/>
+          <p:nvPr/>
+        </p:nvSpPr>
+        <p:spPr>
+          <a:xfrm>
+            <a:off x="254000" y="635000"/>
+            <a:ext cx="1905000" cy="381000"/>
+          </a:xfrm>
+          <a:prstGeom prst="rect">
+            <a:avLst/>
+          </a:prstGeom>
+        </p:spPr>
+        <p:txBody>
+          <a:bodyPr anchor="t" rtlCol="false"/>
+          <a:lstStyle/>
+          <a:p>
+            <a:pPr algn="l"/>
+            <a:r>
+              <a:t/>
+            </a:r>
+            <a:endParaRPr lang="en-US" sz="1100"/>
+          </a:p>
+          <a:p>
+            <a:r>
+              <a:rPr lang="en-US" sz="2400">
+                <a:solidFill>
+                  <a:srgbClr val="000000"/>
+                </a:solidFill>
+              </a:rPr>
+              <a:t>image:</a:t>
+            </a:r>
+          </a:p>
+        </p:txBody>
+      </p:sp>
+      <p:sp>
+        <p:nvSpPr>
+          <p:cNvPr name="TextBox 4" id="5"/>
+          <p:cNvSpPr txBox="true"/>
+          <p:nvPr/>
+        </p:nvSpPr>
+        <p:spPr>
+          <a:xfrm>
+            <a:off x="2159000" y="635000"/>
+            <a:ext cx="6350000" cy="381000"/>
+          </a:xfrm>
+          <a:prstGeom prst="rect">
+            <a:avLst/>
+          </a:prstGeom>
+        </p:spPr>
+        <p:txBody>
+          <a:bodyPr anchor="t" rtlCol="false"/>
+          <a:lstStyle/>
+          <a:p>
+            <a:pPr algn="l"/>
+            <a:r>
+              <a:t/>
+            </a:r>
+            <a:endParaRPr lang="en-US" sz="1100"/>
+          </a:p>
+          <a:p>
+            <a:r>
+              <a:rPr lang="en-US" sz="2400">
+                <a:solidFill>
+                  <a:srgbClr val="0000FF"/>
+                </a:solidFill>
+              </a:rPr>
+              <a:t>"Laszlo - Princess Henry of Battenberg.jpg"</a:t>
+            </a:r>
+          </a:p>
+        </p:txBody>
+      </p:sp>
     </p:spTree>
   </p:cSld>
   <p:clrMapOvr>
@@ -9803,6 +9951,80 @@
           </a:p>
         </p:txBody>
       </p:sp>
+      <p:sp>
+        <p:nvSpPr>
+          <p:cNvPr name="TextBox 3" id="4"/>
+          <p:cNvSpPr txBox="true"/>
+          <p:nvPr/>
+        </p:nvSpPr>
+        <p:spPr>
+          <a:xfrm>
+            <a:off x="254000" y="635000"/>
+            <a:ext cx="1905000" cy="381000"/>
+          </a:xfrm>
+          <a:prstGeom prst="rect">
+            <a:avLst/>
+          </a:prstGeom>
+        </p:spPr>
+        <p:txBody>
+          <a:bodyPr anchor="t" rtlCol="false"/>
+          <a:lstStyle/>
+          <a:p>
+            <a:pPr algn="l"/>
+            <a:r>
+              <a:t/>
+            </a:r>
+            <a:endParaRPr lang="en-US" sz="1100"/>
+          </a:p>
+          <a:p>
+            <a:r>
+              <a:rPr lang="en-US" sz="2400">
+                <a:solidFill>
+                  <a:srgbClr val="000000"/>
+                </a:solidFill>
+              </a:rPr>
+              <a:t>image:</a:t>
+            </a:r>
+          </a:p>
+        </p:txBody>
+      </p:sp>
+      <p:sp>
+        <p:nvSpPr>
+          <p:cNvPr name="TextBox 4" id="5"/>
+          <p:cNvSpPr txBox="true"/>
+          <p:nvPr/>
+        </p:nvSpPr>
+        <p:spPr>
+          <a:xfrm>
+            <a:off x="2159000" y="635000"/>
+            <a:ext cx="6350000" cy="381000"/>
+          </a:xfrm>
+          <a:prstGeom prst="rect">
+            <a:avLst/>
+          </a:prstGeom>
+        </p:spPr>
+        <p:txBody>
+          <a:bodyPr anchor="t" rtlCol="false"/>
+          <a:lstStyle/>
+          <a:p>
+            <a:pPr algn="l"/>
+            <a:r>
+              <a:t/>
+            </a:r>
+            <a:endParaRPr lang="en-US" sz="1100"/>
+          </a:p>
+          <a:p>
+            <a:r>
+              <a:rPr lang="en-US" sz="2400">
+                <a:solidFill>
+                  <a:srgbClr val="0000FF"/>
+                </a:solidFill>
+              </a:rPr>
+              <a:t>"Victoria, Princess Royal.jpg"</a:t>
+            </a:r>
+          </a:p>
+        </p:txBody>
+      </p:sp>
     </p:spTree>
   </p:cSld>
   <p:clrMapOvr>
@@ -9903,6 +10125,80 @@
           </a:p>
         </p:txBody>
       </p:sp>
+      <p:sp>
+        <p:nvSpPr>
+          <p:cNvPr name="TextBox 3" id="4"/>
+          <p:cNvSpPr txBox="true"/>
+          <p:nvPr/>
+        </p:nvSpPr>
+        <p:spPr>
+          <a:xfrm>
+            <a:off x="254000" y="635000"/>
+            <a:ext cx="1905000" cy="381000"/>
+          </a:xfrm>
+          <a:prstGeom prst="rect">
+            <a:avLst/>
+          </a:prstGeom>
+        </p:spPr>
+        <p:txBody>
+          <a:bodyPr anchor="t" rtlCol="false"/>
+          <a:lstStyle/>
+          <a:p>
+            <a:pPr algn="l"/>
+            <a:r>
+              <a:t/>
+            </a:r>
+            <a:endParaRPr lang="en-US" sz="1100"/>
+          </a:p>
+          <a:p>
+            <a:r>
+              <a:rPr lang="en-US" sz="2400">
+                <a:solidFill>
+                  <a:srgbClr val="000000"/>
+                </a:solidFill>
+              </a:rPr>
+              <a:t>image:</a:t>
+            </a:r>
+          </a:p>
+        </p:txBody>
+      </p:sp>
+      <p:sp>
+        <p:nvSpPr>
+          <p:cNvPr name="TextBox 4" id="5"/>
+          <p:cNvSpPr txBox="true"/>
+          <p:nvPr/>
+        </p:nvSpPr>
+        <p:spPr>
+          <a:xfrm>
+            <a:off x="2159000" y="635000"/>
+            <a:ext cx="6350000" cy="381000"/>
+          </a:xfrm>
+          <a:prstGeom prst="rect">
+            <a:avLst/>
+          </a:prstGeom>
+        </p:spPr>
+        <p:txBody>
+          <a:bodyPr anchor="t" rtlCol="false"/>
+          <a:lstStyle/>
+          <a:p>
+            <a:pPr algn="l"/>
+            <a:r>
+              <a:t/>
+            </a:r>
+            <a:endParaRPr lang="en-US" sz="1100"/>
+          </a:p>
+          <a:p>
+            <a:r>
+              <a:rPr lang="en-US" sz="2400">
+                <a:solidFill>
+                  <a:srgbClr val="0000FF"/>
+                </a:solidFill>
+              </a:rPr>
+              <a:t>"Edward VII in coronation robes.jpg"</a:t>
+            </a:r>
+          </a:p>
+        </p:txBody>
+      </p:sp>
     </p:spTree>
   </p:cSld>
   <p:clrMapOvr>
@@ -10003,6 +10299,80 @@
           </a:p>
         </p:txBody>
       </p:sp>
+      <p:sp>
+        <p:nvSpPr>
+          <p:cNvPr name="TextBox 3" id="4"/>
+          <p:cNvSpPr txBox="true"/>
+          <p:nvPr/>
+        </p:nvSpPr>
+        <p:spPr>
+          <a:xfrm>
+            <a:off x="254000" y="635000"/>
+            <a:ext cx="1905000" cy="381000"/>
+          </a:xfrm>
+          <a:prstGeom prst="rect">
+            <a:avLst/>
+          </a:prstGeom>
+        </p:spPr>
+        <p:txBody>
+          <a:bodyPr anchor="t" rtlCol="false"/>
+          <a:lstStyle/>
+          <a:p>
+            <a:pPr algn="l"/>
+            <a:r>
+              <a:t/>
+            </a:r>
+            <a:endParaRPr lang="en-US" sz="1100"/>
+          </a:p>
+          <a:p>
+            <a:r>
+              <a:rPr lang="en-US" sz="2400">
+                <a:solidFill>
+                  <a:srgbClr val="000000"/>
+                </a:solidFill>
+              </a:rPr>
+              <a:t>image:</a:t>
+            </a:r>
+          </a:p>
+        </p:txBody>
+      </p:sp>
+      <p:sp>
+        <p:nvSpPr>
+          <p:cNvPr name="TextBox 4" id="5"/>
+          <p:cNvSpPr txBox="true"/>
+          <p:nvPr/>
+        </p:nvSpPr>
+        <p:spPr>
+          <a:xfrm>
+            <a:off x="2159000" y="635000"/>
+            <a:ext cx="6350000" cy="381000"/>
+          </a:xfrm>
+          <a:prstGeom prst="rect">
+            <a:avLst/>
+          </a:prstGeom>
+        </p:spPr>
+        <p:txBody>
+          <a:bodyPr anchor="t" rtlCol="false"/>
+          <a:lstStyle/>
+          <a:p>
+            <a:pPr algn="l"/>
+            <a:r>
+              <a:t/>
+            </a:r>
+            <a:endParaRPr lang="en-US" sz="1100"/>
+          </a:p>
+          <a:p>
+            <a:r>
+              <a:rPr lang="en-US" sz="2400">
+                <a:solidFill>
+                  <a:srgbClr val="0000FF"/>
+                </a:solidFill>
+              </a:rPr>
+              <a:t>"Princess Alice 1861.png"</a:t>
+            </a:r>
+          </a:p>
+        </p:txBody>
+      </p:sp>
     </p:spTree>
   </p:cSld>
   <p:clrMapOvr>
@@ -10103,6 +10473,80 @@
           </a:p>
         </p:txBody>
       </p:sp>
+      <p:sp>
+        <p:nvSpPr>
+          <p:cNvPr name="TextBox 3" id="4"/>
+          <p:cNvSpPr txBox="true"/>
+          <p:nvPr/>
+        </p:nvSpPr>
+        <p:spPr>
+          <a:xfrm>
+            <a:off x="254000" y="635000"/>
+            <a:ext cx="1905000" cy="381000"/>
+          </a:xfrm>
+          <a:prstGeom prst="rect">
+            <a:avLst/>
+          </a:prstGeom>
+        </p:spPr>
+        <p:txBody>
+          <a:bodyPr anchor="t" rtlCol="false"/>
+          <a:lstStyle/>
+          <a:p>
+            <a:pPr algn="l"/>
+            <a:r>
+              <a:t/>
+            </a:r>
+            <a:endParaRPr lang="en-US" sz="1100"/>
+          </a:p>
+          <a:p>
+            <a:r>
+              <a:rPr lang="en-US" sz="2400">
+                <a:solidFill>
+                  <a:srgbClr val="000000"/>
+                </a:solidFill>
+              </a:rPr>
+              <a:t>image:</a:t>
+            </a:r>
+          </a:p>
+        </p:txBody>
+      </p:sp>
+      <p:sp>
+        <p:nvSpPr>
+          <p:cNvPr name="TextBox 4" id="5"/>
+          <p:cNvSpPr txBox="true"/>
+          <p:nvPr/>
+        </p:nvSpPr>
+        <p:spPr>
+          <a:xfrm>
+            <a:off x="2159000" y="635000"/>
+            <a:ext cx="6350000" cy="381000"/>
+          </a:xfrm>
+          <a:prstGeom prst="rect">
+            <a:avLst/>
+          </a:prstGeom>
+        </p:spPr>
+        <p:txBody>
+          <a:bodyPr anchor="t" rtlCol="false"/>
+          <a:lstStyle/>
+          <a:p>
+            <a:pPr algn="l"/>
+            <a:r>
+              <a:t/>
+            </a:r>
+            <a:endParaRPr lang="en-US" sz="1100"/>
+          </a:p>
+          <a:p>
+            <a:r>
+              <a:rPr lang="en-US" sz="2400">
+                <a:solidFill>
+                  <a:srgbClr val="0000FF"/>
+                </a:solidFill>
+              </a:rPr>
+              <a:t>"Alfred-sachsen-coburg-gotha.jpg"</a:t>
+            </a:r>
+          </a:p>
+        </p:txBody>
+      </p:sp>
     </p:spTree>
   </p:cSld>
   <p:clrMapOvr>
@@ -10203,6 +10647,80 @@
           </a:p>
         </p:txBody>
       </p:sp>
+      <p:sp>
+        <p:nvSpPr>
+          <p:cNvPr name="TextBox 3" id="4"/>
+          <p:cNvSpPr txBox="true"/>
+          <p:nvPr/>
+        </p:nvSpPr>
+        <p:spPr>
+          <a:xfrm>
+            <a:off x="254000" y="635000"/>
+            <a:ext cx="1905000" cy="381000"/>
+          </a:xfrm>
+          <a:prstGeom prst="rect">
+            <a:avLst/>
+          </a:prstGeom>
+        </p:spPr>
+        <p:txBody>
+          <a:bodyPr anchor="t" rtlCol="false"/>
+          <a:lstStyle/>
+          <a:p>
+            <a:pPr algn="l"/>
+            <a:r>
+              <a:t/>
+            </a:r>
+            <a:endParaRPr lang="en-US" sz="1100"/>
+          </a:p>
+          <a:p>
+            <a:r>
+              <a:rPr lang="en-US" sz="2400">
+                <a:solidFill>
+                  <a:srgbClr val="000000"/>
+                </a:solidFill>
+              </a:rPr>
+              <a:t>image:</a:t>
+            </a:r>
+          </a:p>
+        </p:txBody>
+      </p:sp>
+      <p:sp>
+        <p:nvSpPr>
+          <p:cNvPr name="TextBox 4" id="5"/>
+          <p:cNvSpPr txBox="true"/>
+          <p:nvPr/>
+        </p:nvSpPr>
+        <p:spPr>
+          <a:xfrm>
+            <a:off x="2159000" y="635000"/>
+            <a:ext cx="6350000" cy="381000"/>
+          </a:xfrm>
+          <a:prstGeom prst="rect">
+            <a:avLst/>
+          </a:prstGeom>
+        </p:spPr>
+        <p:txBody>
+          <a:bodyPr anchor="t" rtlCol="false"/>
+          <a:lstStyle/>
+          <a:p>
+            <a:pPr algn="l"/>
+            <a:r>
+              <a:t/>
+            </a:r>
+            <a:endParaRPr lang="en-US" sz="1100"/>
+          </a:p>
+          <a:p>
+            <a:r>
+              <a:rPr lang="en-US" sz="2400">
+                <a:solidFill>
+                  <a:srgbClr val="0000FF"/>
+                </a:solidFill>
+              </a:rPr>
+              <a:t>"Helena scan.jpg"</a:t>
+            </a:r>
+          </a:p>
+        </p:txBody>
+      </p:sp>
     </p:spTree>
   </p:cSld>
   <p:clrMapOvr>
@@ -10303,6 +10821,80 @@
           </a:p>
         </p:txBody>
       </p:sp>
+      <p:sp>
+        <p:nvSpPr>
+          <p:cNvPr name="TextBox 3" id="4"/>
+          <p:cNvSpPr txBox="true"/>
+          <p:nvPr/>
+        </p:nvSpPr>
+        <p:spPr>
+          <a:xfrm>
+            <a:off x="254000" y="635000"/>
+            <a:ext cx="1905000" cy="381000"/>
+          </a:xfrm>
+          <a:prstGeom prst="rect">
+            <a:avLst/>
+          </a:prstGeom>
+        </p:spPr>
+        <p:txBody>
+          <a:bodyPr anchor="t" rtlCol="false"/>
+          <a:lstStyle/>
+          <a:p>
+            <a:pPr algn="l"/>
+            <a:r>
+              <a:t/>
+            </a:r>
+            <a:endParaRPr lang="en-US" sz="1100"/>
+          </a:p>
+          <a:p>
+            <a:r>
+              <a:rPr lang="en-US" sz="2400">
+                <a:solidFill>
+                  <a:srgbClr val="000000"/>
+                </a:solidFill>
+              </a:rPr>
+              <a:t>image:</a:t>
+            </a:r>
+          </a:p>
+        </p:txBody>
+      </p:sp>
+      <p:sp>
+        <p:nvSpPr>
+          <p:cNvPr name="TextBox 4" id="5"/>
+          <p:cNvSpPr txBox="true"/>
+          <p:nvPr/>
+        </p:nvSpPr>
+        <p:spPr>
+          <a:xfrm>
+            <a:off x="2159000" y="635000"/>
+            <a:ext cx="6350000" cy="381000"/>
+          </a:xfrm>
+          <a:prstGeom prst="rect">
+            <a:avLst/>
+          </a:prstGeom>
+        </p:spPr>
+        <p:txBody>
+          <a:bodyPr anchor="t" rtlCol="false"/>
+          <a:lstStyle/>
+          <a:p>
+            <a:pPr algn="l"/>
+            <a:r>
+              <a:t/>
+            </a:r>
+            <a:endParaRPr lang="en-US" sz="1100"/>
+          </a:p>
+          <a:p>
+            <a:r>
+              <a:rPr lang="en-US" sz="2400">
+                <a:solidFill>
+                  <a:srgbClr val="0000FF"/>
+                </a:solidFill>
+              </a:rPr>
+              <a:t>"Princess Louise 1901 copy.jpg"</a:t>
+            </a:r>
+          </a:p>
+        </p:txBody>
+      </p:sp>
     </p:spTree>
   </p:cSld>
   <p:clrMapOvr>
@@ -10403,6 +10995,80 @@
           </a:p>
         </p:txBody>
       </p:sp>
+      <p:sp>
+        <p:nvSpPr>
+          <p:cNvPr name="TextBox 3" id="4"/>
+          <p:cNvSpPr txBox="true"/>
+          <p:nvPr/>
+        </p:nvSpPr>
+        <p:spPr>
+          <a:xfrm>
+            <a:off x="254000" y="635000"/>
+            <a:ext cx="1905000" cy="381000"/>
+          </a:xfrm>
+          <a:prstGeom prst="rect">
+            <a:avLst/>
+          </a:prstGeom>
+        </p:spPr>
+        <p:txBody>
+          <a:bodyPr anchor="t" rtlCol="false"/>
+          <a:lstStyle/>
+          <a:p>
+            <a:pPr algn="l"/>
+            <a:r>
+              <a:t/>
+            </a:r>
+            <a:endParaRPr lang="en-US" sz="1100"/>
+          </a:p>
+          <a:p>
+            <a:r>
+              <a:rPr lang="en-US" sz="2400">
+                <a:solidFill>
+                  <a:srgbClr val="000000"/>
+                </a:solidFill>
+              </a:rPr>
+              <a:t>image:</a:t>
+            </a:r>
+          </a:p>
+        </p:txBody>
+      </p:sp>
+      <p:sp>
+        <p:nvSpPr>
+          <p:cNvPr name="TextBox 4" id="5"/>
+          <p:cNvSpPr txBox="true"/>
+          <p:nvPr/>
+        </p:nvSpPr>
+        <p:spPr>
+          <a:xfrm>
+            <a:off x="2159000" y="635000"/>
+            <a:ext cx="6350000" cy="381000"/>
+          </a:xfrm>
+          <a:prstGeom prst="rect">
+            <a:avLst/>
+          </a:prstGeom>
+        </p:spPr>
+        <p:txBody>
+          <a:bodyPr anchor="t" rtlCol="false"/>
+          <a:lstStyle/>
+          <a:p>
+            <a:pPr algn="l"/>
+            <a:r>
+              <a:t/>
+            </a:r>
+            <a:endParaRPr lang="en-US" sz="1100"/>
+          </a:p>
+          <a:p>
+            <a:r>
+              <a:rPr lang="en-US" sz="2400">
+                <a:solidFill>
+                  <a:srgbClr val="0000FF"/>
+                </a:solidFill>
+              </a:rPr>
+              <a:t>"Duke of Connaught and Strathearn.jpg"</a:t>
+            </a:r>
+          </a:p>
+        </p:txBody>
+      </p:sp>
     </p:spTree>
   </p:cSld>
   <p:clrMapOvr>
@@ -10499,6 +11165,80 @@
                 <a:hlinkClick r:id="rId2" tooltip="http://royal-family.bitplan.com/index.php/Prince_Leopold,_Duke_of_Albany"/>
               </a:rPr>
               <a:t>Prince Leopold, Duke of Albany</a:t>
+            </a:r>
+          </a:p>
+        </p:txBody>
+      </p:sp>
+      <p:sp>
+        <p:nvSpPr>
+          <p:cNvPr name="TextBox 3" id="4"/>
+          <p:cNvSpPr txBox="true"/>
+          <p:nvPr/>
+        </p:nvSpPr>
+        <p:spPr>
+          <a:xfrm>
+            <a:off x="254000" y="635000"/>
+            <a:ext cx="1905000" cy="381000"/>
+          </a:xfrm>
+          <a:prstGeom prst="rect">
+            <a:avLst/>
+          </a:prstGeom>
+        </p:spPr>
+        <p:txBody>
+          <a:bodyPr anchor="t" rtlCol="false"/>
+          <a:lstStyle/>
+          <a:p>
+            <a:pPr algn="l"/>
+            <a:r>
+              <a:t/>
+            </a:r>
+            <a:endParaRPr lang="en-US" sz="1100"/>
+          </a:p>
+          <a:p>
+            <a:r>
+              <a:rPr lang="en-US" sz="2400">
+                <a:solidFill>
+                  <a:srgbClr val="000000"/>
+                </a:solidFill>
+              </a:rPr>
+              <a:t>image:</a:t>
+            </a:r>
+          </a:p>
+        </p:txBody>
+      </p:sp>
+      <p:sp>
+        <p:nvSpPr>
+          <p:cNvPr name="TextBox 4" id="5"/>
+          <p:cNvSpPr txBox="true"/>
+          <p:nvPr/>
+        </p:nvSpPr>
+        <p:spPr>
+          <a:xfrm>
+            <a:off x="2159000" y="635000"/>
+            <a:ext cx="6350000" cy="381000"/>
+          </a:xfrm>
+          <a:prstGeom prst="rect">
+            <a:avLst/>
+          </a:prstGeom>
+        </p:spPr>
+        <p:txBody>
+          <a:bodyPr anchor="t" rtlCol="false"/>
+          <a:lstStyle/>
+          <a:p>
+            <a:pPr algn="l"/>
+            <a:r>
+              <a:t/>
+            </a:r>
+            <a:endParaRPr lang="en-US" sz="1100"/>
+          </a:p>
+          <a:p>
+            <a:r>
+              <a:rPr lang="en-US" sz="2400">
+                <a:solidFill>
+                  <a:srgbClr val="0000FF"/>
+                </a:solidFill>
+              </a:rPr>
+              <a:t>"Prince Leopold, Duke of Albany - Project Gutenberg eText 13103.jpg"</a:t>
             </a:r>
           </a:p>
         </p:txBody>

</xml_diff>

<commit_message>
refactors to improve image and property handling
</commit_message>
<xml_diff>
--- a/QueenVictoria.pptx
+++ b/QueenVictoria.pptx
@@ -1199,6 +1199,13 @@
             <a:pPr lvl="0"/>
             <a:r>
               <a:rPr lang="en-US"/>
+              <a:t>picture (picture) = BufferedImage@5c10285a: type = 10 ColorModel: #pixelBits = 8 numComponents = 1 color space = java.awt.color.ICC_ColorSpace@6b667cb3 transparency = 1 has alpha = false isAlphaPre = false ByteInterleavedRaster: width = 2729 height = 3851 #numDataElements 1 dataOff[0] = 0</a:t>
+            </a:r>
+          </a:p>
+          <a:p>
+            <a:pPr lvl="0"/>
+            <a:r>
+              <a:rPr lang="en-US"/>
               <a:t>family (P53) = http://www.wikidata.org/entity/Q157217 (item)</a:t>
             </a:r>
           </a:p>
@@ -1725,6 +1732,13 @@
             <a:pPr lvl="0"/>
             <a:r>
               <a:rPr lang="en-US"/>
+              <a:t>picture (picture) = BufferedImage@60cf62ad: type = 5 ColorModel: #pixelBits = 24 numComponents = 3 color space = java.awt.color.ICC_ColorSpace@167279d1 transparency = 1 has alpha = false isAlphaPre = false ByteInterleavedRaster: width = 361 height = 500 #numDataElements 3 dataOff[0] = 2</a:t>
+            </a:r>
+          </a:p>
+          <a:p>
+            <a:pPr lvl="0"/>
+            <a:r>
+              <a:rPr lang="en-US"/>
               <a:t>instance of (P31) = http://www.wikidata.org/entity/Q5 (item)</a:t>
             </a:r>
           </a:p>
@@ -2356,6 +2370,13 @@
             <a:pPr lvl="0"/>
             <a:r>
               <a:rPr lang="en-US"/>
+              <a:t>picture (picture) = BufferedImage@66ad7bf0: type = 5 ColorModel: #pixelBits = 24 numComponents = 3 color space = java.awt.color.ICC_ColorSpace@167279d1 transparency = 1 has alpha = false isAlphaPre = false ByteInterleavedRaster: width = 1590 height = 2000 #numDataElements 3 dataOff[0] = 2</a:t>
+            </a:r>
+          </a:p>
+          <a:p>
+            <a:pPr lvl="0"/>
+            <a:r>
+              <a:rPr lang="en-US"/>
               <a:t>P97 (P97) = http://www.wikidata.org/entity/Q3877594 (item)</a:t>
             </a:r>
           </a:p>
@@ -3169,6 +3190,13 @@
             <a:pPr lvl="0"/>
             <a:r>
               <a:rPr lang="en-US"/>
+              <a:t>picture (picture) = BufferedImage@7dff6d05: type = 5 ColorModel: #pixelBits = 24 numComponents = 3 color space = java.awt.color.ICC_ColorSpace@167279d1 transparency = 1 has alpha = false isAlphaPre = false ByteInterleavedRaster: width = 1936 height = 2728 #numDataElements 3 dataOff[0] = 2</a:t>
+            </a:r>
+          </a:p>
+          <a:p>
+            <a:pPr lvl="0"/>
+            <a:r>
+              <a:rPr lang="en-US"/>
               <a:t>family (P53) = http://www.wikidata.org/entity/Q1753846 (item)</a:t>
             </a:r>
           </a:p>
@@ -3457,6 +3485,160 @@
             <a:pPr lvl="0"/>
             <a:r>
               <a:rPr lang="en-US"/>
+              <a:t>cause of death (P509) = http://www.wikidata.org/entity/Q134649 (item)</a:t>
+            </a:r>
+          </a:p>
+          <a:p>
+            <a:pPr lvl="0"/>
+            <a:r>
+              <a:rPr lang="en-US"/>
+              <a:t>National Library of Israel ID (P949) = 000445221</a:t>
+            </a:r>
+          </a:p>
+          <a:p>
+            <a:pPr lvl="0"/>
+            <a:r>
+              <a:rPr lang="en-US"/>
+              <a:t>source (source) = WikiData</a:t>
+            </a:r>
+          </a:p>
+          <a:p>
+            <a:pPr lvl="0"/>
+            <a:r>
+              <a:rPr lang="en-US"/>
+              <a:t>sex or gender (P21) = http://www.wikidata.org/entity/Q6581072 (item)</a:t>
+            </a:r>
+          </a:p>
+          <a:p>
+            <a:pPr lvl="0"/>
+            <a:r>
+              <a:rPr lang="en-US"/>
+              <a:t>place of death (P20) = http://www.wikidata.org/entity/Q2973 (item)</a:t>
+            </a:r>
+          </a:p>
+          <a:p>
+            <a:pPr lvl="0"/>
+            <a:r>
+              <a:rPr lang="en-US"/>
+              <a:t>described by source (P1343) = [http://www.wikidata.org/entity/Q19034818 (item), http://www.wikidata.org/entity/Q15987216 (item), http://www.wikidata.org/entity/Q602358 (item)]</a:t>
+            </a:r>
+          </a:p>
+          <a:p>
+            <a:pPr lvl="0"/>
+            <a:r>
+              <a:rPr lang="en-US"/>
+              <a:t>father (P22) = http://www.wikidata.org/entity/Q152245 (item)</a:t>
+            </a:r>
+          </a:p>
+          <a:p>
+            <a:pPr lvl="0"/>
+            <a:r>
+              <a:rPr lang="en-US"/>
+              <a:t>mother (P25) = http://www.wikidata.org/entity/Q9439 (item)</a:t>
+            </a:r>
+          </a:p>
+          <a:p>
+            <a:pPr lvl="0"/>
+            <a:r>
+              <a:rPr lang="en-US"/>
+              <a:t>country of citizenship (P27) = http://www.wikidata.org/entity/Q145 (item)</a:t>
+            </a:r>
+          </a:p>
+          <a:p>
+            <a:pPr lvl="0"/>
+            <a:r>
+              <a:rPr lang="en-US"/>
+              <a:t>spouse (P26) = http://www.wikidata.org/entity/Q164498 (item)</a:t>
+            </a:r>
+          </a:p>
+          <a:p>
+            <a:pPr lvl="0"/>
+            <a:r>
+              <a:rPr lang="en-US"/>
+              <a:t>VIAF ID (P214) = 29898975</a:t>
+            </a:r>
+          </a:p>
+          <a:p>
+            <a:pPr lvl="0"/>
+            <a:r>
+              <a:rPr lang="en-US"/>
+              <a:t>ISNI (P213) = 0000 0000 6299 1322</a:t>
+            </a:r>
+          </a:p>
+          <a:p>
+            <a:pPr lvl="0"/>
+            <a:r>
+              <a:rPr lang="en-US"/>
+              <a:t>National Portrait Gallery (London) person ID (P1816) = mp00073</a:t>
+            </a:r>
+          </a:p>
+          <a:p>
+            <a:pPr lvl="0"/>
+            <a:r>
+              <a:rPr lang="en-US"/>
+              <a:t>WikiTree person ID (P2949) = Sachsen-Coburg_und_Gotha-14</a:t>
+            </a:r>
+          </a:p>
+          <a:p>
+            <a:pPr lvl="0"/>
+            <a:r>
+              <a:rPr lang="en-US"/>
+              <a:t>Oxford Dictionary of National Biography ID (P1415) = 347</a:t>
+            </a:r>
+          </a:p>
+          <a:p>
+            <a:pPr lvl="0"/>
+            <a:r>
+              <a:rPr lang="en-US"/>
+              <a:t>P1017 (P1017) = ADV10225521</a:t>
+            </a:r>
+          </a:p>
+          <a:p>
+            <a:pPr lvl="0"/>
+            <a:r>
+              <a:rPr lang="en-US"/>
+              <a:t>given name (P735) = http://www.wikidata.org/entity/Q650689 (item)</a:t>
+            </a:r>
+          </a:p>
+          <a:p>
+            <a:pPr lvl="0"/>
+            <a:r>
+              <a:rPr lang="en-US"/>
+              <a:t>wikidata_type (wikidata_type) = http://www.wikidata.org/ontology#Item</a:t>
+            </a:r>
+          </a:p>
+          <a:p>
+            <a:pPr lvl="0"/>
+            <a:r>
+              <a:rPr lang="en-US"/>
+              <a:t>Commons gallery (P935) = Princess Alice of the United Kingdom</a:t>
+            </a:r>
+          </a:p>
+          <a:p>
+            <a:pPr lvl="0"/>
+            <a:r>
+              <a:rPr lang="en-US"/>
+              <a:t>instance of (P31) = http://www.wikidata.org/entity/Q5 (item)</a:t>
+            </a:r>
+          </a:p>
+          <a:p>
+            <a:pPr lvl="0"/>
+            <a:r>
+              <a:rPr lang="en-US"/>
+              <a:t>SNAC Ark ID (P3430) = w6dc0mcq</a:t>
+            </a:r>
+          </a:p>
+          <a:p>
+            <a:pPr lvl="0"/>
+            <a:r>
+              <a:rPr lang="en-US"/>
+              <a:t>name (name) = Princess Alice of the United Kingdom</a:t>
+            </a:r>
+          </a:p>
+          <a:p>
+            <a:pPr lvl="0"/>
+            <a:r>
+              <a:rPr lang="en-US"/>
               <a:t>P1207 (P1207) = n2010148168</a:t>
             </a:r>
           </a:p>
@@ -3485,13 +3667,6 @@
             <a:pPr lvl="0"/>
             <a:r>
               <a:rPr lang="en-US"/>
-              <a:t>cause of death (P509) = http://www.wikidata.org/entity/Q134649 (item)</a:t>
-            </a:r>
-          </a:p>
-          <a:p>
-            <a:pPr lvl="0"/>
-            <a:r>
-              <a:rPr lang="en-US"/>
               <a:t>National Thesaurus for Author Names ID (P1006) = 069412898</a:t>
             </a:r>
           </a:p>
@@ -3499,20 +3674,6 @@
             <a:pPr lvl="0"/>
             <a:r>
               <a:rPr lang="en-US"/>
-              <a:t>National Library of Israel ID (P949) = 000445221</a:t>
-            </a:r>
-          </a:p>
-          <a:p>
-            <a:pPr lvl="0"/>
-            <a:r>
-              <a:rPr lang="en-US"/>
-              <a:t>source (source) = WikiData</a:t>
-            </a:r>
-          </a:p>
-          <a:p>
-            <a:pPr lvl="0"/>
-            <a:r>
-              <a:rPr lang="en-US"/>
               <a:t>child (P40) = [http://www.wikidata.org/entity/Q57658 (item), http://www.wikidata.org/entity/Q58063 (item), http://www.wikidata.org/entity/Q233990 (item), http://www.wikidata.org/entity/Q57507 (item), http://www.wikidata.org/entity/Q2562528 (item), http://www.wikidata.org/entity/Q152094 (item), http://www.wikidata.org/entity/Q1208045 (item)]</a:t>
             </a:r>
           </a:p>
@@ -3534,13 +3695,6 @@
             <a:pPr lvl="0"/>
             <a:r>
               <a:rPr lang="en-US"/>
-              <a:t>sex or gender (P21) = http://www.wikidata.org/entity/Q6581072 (item)</a:t>
-            </a:r>
-          </a:p>
-          <a:p>
-            <a:pPr lvl="0"/>
-            <a:r>
-              <a:rPr lang="en-US"/>
               <a:t>WeRelate person ID (P4159) = Princess_Alice_of_the_United_Kingdom_(1)</a:t>
             </a:r>
           </a:p>
@@ -3548,48 +3702,6 @@
             <a:pPr lvl="0"/>
             <a:r>
               <a:rPr lang="en-US"/>
-              <a:t>place of death (P20) = http://www.wikidata.org/entity/Q2973 (item)</a:t>
-            </a:r>
-          </a:p>
-          <a:p>
-            <a:pPr lvl="0"/>
-            <a:r>
-              <a:rPr lang="en-US"/>
-              <a:t>described by source (P1343) = [http://www.wikidata.org/entity/Q19034818 (item), http://www.wikidata.org/entity/Q15987216 (item), http://www.wikidata.org/entity/Q602358 (item)]</a:t>
-            </a:r>
-          </a:p>
-          <a:p>
-            <a:pPr lvl="0"/>
-            <a:r>
-              <a:rPr lang="en-US"/>
-              <a:t>father (P22) = http://www.wikidata.org/entity/Q152245 (item)</a:t>
-            </a:r>
-          </a:p>
-          <a:p>
-            <a:pPr lvl="0"/>
-            <a:r>
-              <a:rPr lang="en-US"/>
-              <a:t>mother (P25) = http://www.wikidata.org/entity/Q9439 (item)</a:t>
-            </a:r>
-          </a:p>
-          <a:p>
-            <a:pPr lvl="0"/>
-            <a:r>
-              <a:rPr lang="en-US"/>
-              <a:t>country of citizenship (P27) = http://www.wikidata.org/entity/Q145 (item)</a:t>
-            </a:r>
-          </a:p>
-          <a:p>
-            <a:pPr lvl="0"/>
-            <a:r>
-              <a:rPr lang="en-US"/>
-              <a:t>spouse (P26) = http://www.wikidata.org/entity/Q164498 (item)</a:t>
-            </a:r>
-          </a:p>
-          <a:p>
-            <a:pPr lvl="0"/>
-            <a:r>
-              <a:rPr lang="en-US"/>
               <a:t>Commons category (P373) = Alice of the United Kingdom</a:t>
             </a:r>
           </a:p>
@@ -3611,34 +3723,6 @@
             <a:pPr lvl="0"/>
             <a:r>
               <a:rPr lang="en-US"/>
-              <a:t>VIAF ID (P214) = 29898975</a:t>
-            </a:r>
-          </a:p>
-          <a:p>
-            <a:pPr lvl="0"/>
-            <a:r>
-              <a:rPr lang="en-US"/>
-              <a:t>ISNI (P213) = 0000 0000 6299 1322</a:t>
-            </a:r>
-          </a:p>
-          <a:p>
-            <a:pPr lvl="0"/>
-            <a:r>
-              <a:rPr lang="en-US"/>
-              <a:t>National Portrait Gallery (London) person ID (P1816) = mp00073</a:t>
-            </a:r>
-          </a:p>
-          <a:p>
-            <a:pPr lvl="0"/>
-            <a:r>
-              <a:rPr lang="en-US"/>
-              <a:t>WikiTree person ID (P2949) = Sachsen-Coburg_und_Gotha-14</a:t>
-            </a:r>
-          </a:p>
-          <a:p>
-            <a:pPr lvl="0"/>
-            <a:r>
-              <a:rPr lang="en-US"/>
               <a:t>name in native language (P1559) = "Alice of Saxe-Coburg and Gotha" (en)</a:t>
             </a:r>
           </a:p>
@@ -3653,13 +3737,6 @@
             <a:pPr lvl="0"/>
             <a:r>
               <a:rPr lang="en-US"/>
-              <a:t>Oxford Dictionary of National Biography ID (P1415) = 347</a:t>
-            </a:r>
-          </a:p>
-          <a:p>
-            <a:pPr lvl="0"/>
-            <a:r>
-              <a:rPr lang="en-US"/>
               <a:t>coat of arms image (P94) = Coat of Arms of Alice, Grand Duchess of Hesse.svg</a:t>
             </a:r>
           </a:p>
@@ -3667,13 +3744,6 @@
             <a:pPr lvl="0"/>
             <a:r>
               <a:rPr lang="en-US"/>
-              <a:t>P1017 (P1017) = ADV10225521</a:t>
-            </a:r>
-          </a:p>
-          <a:p>
-            <a:pPr lvl="0"/>
-            <a:r>
-              <a:rPr lang="en-US"/>
               <a:t>label_en (label_en) = Princess Alice of the United Kingdom</a:t>
             </a:r>
           </a:p>
@@ -3681,20 +3751,6 @@
             <a:pPr lvl="0"/>
             <a:r>
               <a:rPr lang="en-US"/>
-              <a:t>given name (P735) = http://www.wikidata.org/entity/Q650689 (item)</a:t>
-            </a:r>
-          </a:p>
-          <a:p>
-            <a:pPr lvl="0"/>
-            <a:r>
-              <a:rPr lang="en-US"/>
-              <a:t>wikidata_type (wikidata_type) = http://www.wikidata.org/ontology#Item</a:t>
-            </a:r>
-          </a:p>
-          <a:p>
-            <a:pPr lvl="0"/>
-            <a:r>
-              <a:rPr lang="en-US"/>
               <a:t>P1477 (P1477) = "Alice of Saxe-Coburg and Gotha" (en)</a:t>
             </a:r>
           </a:p>
@@ -3702,14 +3758,7 @@
             <a:pPr lvl="0"/>
             <a:r>
               <a:rPr lang="en-US"/>
-              <a:t>Commons gallery (P935) = Princess Alice of the United Kingdom</a:t>
-            </a:r>
-          </a:p>
-          <a:p>
-            <a:pPr lvl="0"/>
-            <a:r>
-              <a:rPr lang="en-US"/>
-              <a:t>instance of (P31) = http://www.wikidata.org/entity/Q5 (item)</a:t>
+              <a:t>picture (picture) = BufferedImage@4da9f723: type = 6 ColorModel: #pixelBits = 32 numComponents = 4 color space = java.awt.color.ICC_ColorSpace@167279d1 transparency = 3 has alpha = true isAlphaPre = false ByteInterleavedRaster: width = 1118 height = 1462 #numDataElements 4 dataOff[0] = 3</a:t>
             </a:r>
           </a:p>
           <a:p>
@@ -3730,13 +3779,6 @@
             <a:pPr lvl="0"/>
             <a:r>
               <a:rPr lang="en-US"/>
-              <a:t>SNAC Ark ID (P3430) = w6dc0mcq</a:t>
-            </a:r>
-          </a:p>
-          <a:p>
-            <a:pPr lvl="0"/>
-            <a:r>
-              <a:rPr lang="en-US"/>
               <a:t>manner of death (P1196) = http://www.wikidata.org/entity/Q3739104 (item)</a:t>
             </a:r>
           </a:p>
@@ -3752,13 +3794,6 @@
             <a:r>
               <a:rPr lang="en-US"/>
               <a:t>image (P18) = Princess Alice 1861.png</a:t>
-            </a:r>
-          </a:p>
-          <a:p>
-            <a:pPr lvl="0"/>
-            <a:r>
-              <a:rPr lang="en-US"/>
-              <a:t>name (name) = Princess Alice of the United Kingdom</a:t>
             </a:r>
           </a:p>
           <a:p>
@@ -4305,6 +4340,13 @@
             <a:pPr lvl="0"/>
             <a:r>
               <a:rPr lang="en-US"/>
+              <a:t>picture (picture) = BufferedImage@14d8444b: type = 5 ColorModel: #pixelBits = 24 numComponents = 3 color space = java.awt.color.ICC_ColorSpace@167279d1 transparency = 1 has alpha = false isAlphaPre = false ByteInterleavedRaster: width = 376 height = 565 #numDataElements 3 dataOff[0] = 2</a:t>
+            </a:r>
+          </a:p>
+          <a:p>
+            <a:pPr lvl="0"/>
+            <a:r>
+              <a:rPr lang="en-US"/>
               <a:t>family (P53) = http://www.wikidata.org/entity/Q1753846 (item)</a:t>
             </a:r>
           </a:p>
@@ -4803,6 +4845,13 @@
             <a:pPr lvl="0"/>
             <a:r>
               <a:rPr lang="en-US"/>
+              <a:t>picture (picture) = BufferedImage@56f521c6: type = 10 ColorModel: #pixelBits = 8 numComponents = 1 color space = java.awt.color.ICC_ColorSpace@6b667cb3 transparency = 1 has alpha = false isAlphaPre = false ByteInterleavedRaster: width = 1702 height = 2704 #numDataElements 1 dataOff[0] = 0</a:t>
+            </a:r>
+          </a:p>
+          <a:p>
+            <a:pPr lvl="0"/>
+            <a:r>
+              <a:rPr lang="en-US"/>
               <a:t>instance of (P31) = http://www.wikidata.org/entity/Q5 (item)</a:t>
             </a:r>
           </a:p>
@@ -5399,6 +5448,13 @@
             <a:pPr lvl="0"/>
             <a:r>
               <a:rPr lang="en-US"/>
+              <a:t>picture (picture) = BufferedImage@a518813: type = 10 ColorModel: #pixelBits = 8 numComponents = 1 color space = java.awt.color.ICC_ColorSpace@6b667cb3 transparency = 1 has alpha = false isAlphaPre = false ByteInterleavedRaster: width = 1026 height = 1500 #numDataElements 1 dataOff[0] = 0</a:t>
+            </a:r>
+          </a:p>
+          <a:p>
+            <a:pPr lvl="0"/>
+            <a:r>
+              <a:rPr lang="en-US"/>
               <a:t>family (P53) = http://www.wikidata.org/entity/Q1753846 (item)</a:t>
             </a:r>
           </a:p>
@@ -5967,6 +6023,13 @@
             <a:pPr lvl="0"/>
             <a:r>
               <a:rPr lang="en-US"/>
+              <a:t>picture (picture) = BufferedImage@44924587: type = 10 ColorModel: #pixelBits = 8 numComponents = 1 color space = java.awt.color.ICC_ColorSpace@6b667cb3 transparency = 1 has alpha = false isAlphaPre = false ByteInterleavedRaster: width = 417 height = 560 #numDataElements 1 dataOff[0] = 0</a:t>
+            </a:r>
+          </a:p>
+          <a:p>
+            <a:pPr lvl="0"/>
+            <a:r>
+              <a:rPr lang="en-US"/>
               <a:t>family (P53) = http://www.wikidata.org/entity/Q81589 (item)</a:t>
             </a:r>
           </a:p>
@@ -6438,6 +6501,13 @@
             <a:r>
               <a:rPr lang="en-US"/>
               <a:t>wikidata_type (wikidata_type) = http://www.wikidata.org/ontology#Item</a:t>
+            </a:r>
+          </a:p>
+          <a:p>
+            <a:pPr lvl="0"/>
+            <a:r>
+              <a:rPr lang="en-US"/>
+              <a:t>picture (picture) = BufferedImage@7c251f90: type = 5 ColorModel: #pixelBits = 24 numComponents = 3 color space = java.awt.color.ICC_ColorSpace@167279d1 transparency = 1 has alpha = false isAlphaPre = false ByteInterleavedRaster: width = 213 height = 289 #numDataElements 3 dataOff[0] = 2</a:t>
             </a:r>
           </a:p>
           <a:p>
@@ -9635,7 +9705,7 @@
                   <a:srgbClr val="000000"/>
                 </a:solidFill>
               </a:rPr>
-              <a:t>image:</a:t>
+              <a:t>wikidata_id:</a:t>
             </a:r>
           </a:p>
         </p:txBody>
@@ -9672,7 +9742,81 @@
                   <a:srgbClr val="0000FF"/>
                 </a:solidFill>
               </a:rPr>
-              <a:t>"Queen Victoria by Bassano.jpg"</a:t>
+              <a:t>Q9439</a:t>
+            </a:r>
+          </a:p>
+        </p:txBody>
+      </p:sp>
+      <p:sp>
+        <p:nvSpPr>
+          <p:cNvPr name="TextBox 5" id="6"/>
+          <p:cNvSpPr txBox="true"/>
+          <p:nvPr/>
+        </p:nvSpPr>
+        <p:spPr>
+          <a:xfrm>
+            <a:off x="254000" y="1016000"/>
+            <a:ext cx="1905000" cy="381000"/>
+          </a:xfrm>
+          <a:prstGeom prst="rect">
+            <a:avLst/>
+          </a:prstGeom>
+        </p:spPr>
+        <p:txBody>
+          <a:bodyPr anchor="t" rtlCol="false"/>
+          <a:lstStyle/>
+          <a:p>
+            <a:pPr algn="l"/>
+            <a:r>
+              <a:t/>
+            </a:r>
+            <a:endParaRPr lang="en-US" sz="1100"/>
+          </a:p>
+          <a:p>
+            <a:r>
+              <a:rPr lang="en-US" sz="2400">
+                <a:solidFill>
+                  <a:srgbClr val="000000"/>
+                </a:solidFill>
+              </a:rPr>
+              <a:t>source:</a:t>
+            </a:r>
+          </a:p>
+        </p:txBody>
+      </p:sp>
+      <p:sp>
+        <p:nvSpPr>
+          <p:cNvPr name="TextBox 6" id="7"/>
+          <p:cNvSpPr txBox="true"/>
+          <p:nvPr/>
+        </p:nvSpPr>
+        <p:spPr>
+          <a:xfrm>
+            <a:off x="2159000" y="1016000"/>
+            <a:ext cx="6350000" cy="381000"/>
+          </a:xfrm>
+          <a:prstGeom prst="rect">
+            <a:avLst/>
+          </a:prstGeom>
+        </p:spPr>
+        <p:txBody>
+          <a:bodyPr anchor="t" rtlCol="false"/>
+          <a:lstStyle/>
+          <a:p>
+            <a:pPr algn="l"/>
+            <a:r>
+              <a:t/>
+            </a:r>
+            <a:endParaRPr lang="en-US" sz="1100"/>
+          </a:p>
+          <a:p>
+            <a:r>
+              <a:rPr lang="en-US" sz="2400">
+                <a:solidFill>
+                  <a:srgbClr val="0000FF"/>
+                </a:solidFill>
+              </a:rPr>
+              <a:t>WikiData</a:t>
             </a:r>
           </a:p>
         </p:txBody>
@@ -9809,7 +9953,7 @@
                   <a:srgbClr val="000000"/>
                 </a:solidFill>
               </a:rPr>
-              <a:t>image:</a:t>
+              <a:t>wikidata_id:</a:t>
             </a:r>
           </a:p>
         </p:txBody>
@@ -9846,7 +9990,81 @@
                   <a:srgbClr val="0000FF"/>
                 </a:solidFill>
               </a:rPr>
-              <a:t>"Laszlo - Princess Henry of Battenberg.jpg"</a:t>
+              <a:t>Q158140</a:t>
+            </a:r>
+          </a:p>
+        </p:txBody>
+      </p:sp>
+      <p:sp>
+        <p:nvSpPr>
+          <p:cNvPr name="TextBox 5" id="6"/>
+          <p:cNvSpPr txBox="true"/>
+          <p:nvPr/>
+        </p:nvSpPr>
+        <p:spPr>
+          <a:xfrm>
+            <a:off x="254000" y="1016000"/>
+            <a:ext cx="1905000" cy="381000"/>
+          </a:xfrm>
+          <a:prstGeom prst="rect">
+            <a:avLst/>
+          </a:prstGeom>
+        </p:spPr>
+        <p:txBody>
+          <a:bodyPr anchor="t" rtlCol="false"/>
+          <a:lstStyle/>
+          <a:p>
+            <a:pPr algn="l"/>
+            <a:r>
+              <a:t/>
+            </a:r>
+            <a:endParaRPr lang="en-US" sz="1100"/>
+          </a:p>
+          <a:p>
+            <a:r>
+              <a:rPr lang="en-US" sz="2400">
+                <a:solidFill>
+                  <a:srgbClr val="000000"/>
+                </a:solidFill>
+              </a:rPr>
+              <a:t>source:</a:t>
+            </a:r>
+          </a:p>
+        </p:txBody>
+      </p:sp>
+      <p:sp>
+        <p:nvSpPr>
+          <p:cNvPr name="TextBox 6" id="7"/>
+          <p:cNvSpPr txBox="true"/>
+          <p:nvPr/>
+        </p:nvSpPr>
+        <p:spPr>
+          <a:xfrm>
+            <a:off x="2159000" y="1016000"/>
+            <a:ext cx="6350000" cy="381000"/>
+          </a:xfrm>
+          <a:prstGeom prst="rect">
+            <a:avLst/>
+          </a:prstGeom>
+        </p:spPr>
+        <p:txBody>
+          <a:bodyPr anchor="t" rtlCol="false"/>
+          <a:lstStyle/>
+          <a:p>
+            <a:pPr algn="l"/>
+            <a:r>
+              <a:t/>
+            </a:r>
+            <a:endParaRPr lang="en-US" sz="1100"/>
+          </a:p>
+          <a:p>
+            <a:r>
+              <a:rPr lang="en-US" sz="2400">
+                <a:solidFill>
+                  <a:srgbClr val="0000FF"/>
+                </a:solidFill>
+              </a:rPr>
+              <a:t>WikiData</a:t>
             </a:r>
           </a:p>
         </p:txBody>
@@ -9983,7 +10201,7 @@
                   <a:srgbClr val="000000"/>
                 </a:solidFill>
               </a:rPr>
-              <a:t>image:</a:t>
+              <a:t>wikidata_id:</a:t>
             </a:r>
           </a:p>
         </p:txBody>
@@ -10020,7 +10238,81 @@
                   <a:srgbClr val="0000FF"/>
                 </a:solidFill>
               </a:rPr>
-              <a:t>"Victoria, Princess Royal.jpg"</a:t>
+              <a:t>Q116728</a:t>
+            </a:r>
+          </a:p>
+        </p:txBody>
+      </p:sp>
+      <p:sp>
+        <p:nvSpPr>
+          <p:cNvPr name="TextBox 5" id="6"/>
+          <p:cNvSpPr txBox="true"/>
+          <p:nvPr/>
+        </p:nvSpPr>
+        <p:spPr>
+          <a:xfrm>
+            <a:off x="254000" y="1016000"/>
+            <a:ext cx="1905000" cy="381000"/>
+          </a:xfrm>
+          <a:prstGeom prst="rect">
+            <a:avLst/>
+          </a:prstGeom>
+        </p:spPr>
+        <p:txBody>
+          <a:bodyPr anchor="t" rtlCol="false"/>
+          <a:lstStyle/>
+          <a:p>
+            <a:pPr algn="l"/>
+            <a:r>
+              <a:t/>
+            </a:r>
+            <a:endParaRPr lang="en-US" sz="1100"/>
+          </a:p>
+          <a:p>
+            <a:r>
+              <a:rPr lang="en-US" sz="2400">
+                <a:solidFill>
+                  <a:srgbClr val="000000"/>
+                </a:solidFill>
+              </a:rPr>
+              <a:t>source:</a:t>
+            </a:r>
+          </a:p>
+        </p:txBody>
+      </p:sp>
+      <p:sp>
+        <p:nvSpPr>
+          <p:cNvPr name="TextBox 6" id="7"/>
+          <p:cNvSpPr txBox="true"/>
+          <p:nvPr/>
+        </p:nvSpPr>
+        <p:spPr>
+          <a:xfrm>
+            <a:off x="2159000" y="1016000"/>
+            <a:ext cx="6350000" cy="381000"/>
+          </a:xfrm>
+          <a:prstGeom prst="rect">
+            <a:avLst/>
+          </a:prstGeom>
+        </p:spPr>
+        <p:txBody>
+          <a:bodyPr anchor="t" rtlCol="false"/>
+          <a:lstStyle/>
+          <a:p>
+            <a:pPr algn="l"/>
+            <a:r>
+              <a:t/>
+            </a:r>
+            <a:endParaRPr lang="en-US" sz="1100"/>
+          </a:p>
+          <a:p>
+            <a:r>
+              <a:rPr lang="en-US" sz="2400">
+                <a:solidFill>
+                  <a:srgbClr val="0000FF"/>
+                </a:solidFill>
+              </a:rPr>
+              <a:t>WikiData</a:t>
             </a:r>
           </a:p>
         </p:txBody>
@@ -10157,7 +10449,7 @@
                   <a:srgbClr val="000000"/>
                 </a:solidFill>
               </a:rPr>
-              <a:t>image:</a:t>
+              <a:t>wikidata_id:</a:t>
             </a:r>
           </a:p>
         </p:txBody>
@@ -10194,7 +10486,81 @@
                   <a:srgbClr val="0000FF"/>
                 </a:solidFill>
               </a:rPr>
-              <a:t>"Edward VII in coronation robes.jpg"</a:t>
+              <a:t>Q20875</a:t>
+            </a:r>
+          </a:p>
+        </p:txBody>
+      </p:sp>
+      <p:sp>
+        <p:nvSpPr>
+          <p:cNvPr name="TextBox 5" id="6"/>
+          <p:cNvSpPr txBox="true"/>
+          <p:nvPr/>
+        </p:nvSpPr>
+        <p:spPr>
+          <a:xfrm>
+            <a:off x="254000" y="1016000"/>
+            <a:ext cx="1905000" cy="381000"/>
+          </a:xfrm>
+          <a:prstGeom prst="rect">
+            <a:avLst/>
+          </a:prstGeom>
+        </p:spPr>
+        <p:txBody>
+          <a:bodyPr anchor="t" rtlCol="false"/>
+          <a:lstStyle/>
+          <a:p>
+            <a:pPr algn="l"/>
+            <a:r>
+              <a:t/>
+            </a:r>
+            <a:endParaRPr lang="en-US" sz="1100"/>
+          </a:p>
+          <a:p>
+            <a:r>
+              <a:rPr lang="en-US" sz="2400">
+                <a:solidFill>
+                  <a:srgbClr val="000000"/>
+                </a:solidFill>
+              </a:rPr>
+              <a:t>source:</a:t>
+            </a:r>
+          </a:p>
+        </p:txBody>
+      </p:sp>
+      <p:sp>
+        <p:nvSpPr>
+          <p:cNvPr name="TextBox 6" id="7"/>
+          <p:cNvSpPr txBox="true"/>
+          <p:nvPr/>
+        </p:nvSpPr>
+        <p:spPr>
+          <a:xfrm>
+            <a:off x="2159000" y="1016000"/>
+            <a:ext cx="6350000" cy="381000"/>
+          </a:xfrm>
+          <a:prstGeom prst="rect">
+            <a:avLst/>
+          </a:prstGeom>
+        </p:spPr>
+        <p:txBody>
+          <a:bodyPr anchor="t" rtlCol="false"/>
+          <a:lstStyle/>
+          <a:p>
+            <a:pPr algn="l"/>
+            <a:r>
+              <a:t/>
+            </a:r>
+            <a:endParaRPr lang="en-US" sz="1100"/>
+          </a:p>
+          <a:p>
+            <a:r>
+              <a:rPr lang="en-US" sz="2400">
+                <a:solidFill>
+                  <a:srgbClr val="0000FF"/>
+                </a:solidFill>
+              </a:rPr>
+              <a:t>WikiData</a:t>
             </a:r>
           </a:p>
         </p:txBody>
@@ -10331,7 +10697,7 @@
                   <a:srgbClr val="000000"/>
                 </a:solidFill>
               </a:rPr>
-              <a:t>image:</a:t>
+              <a:t>wikidata_id:</a:t>
             </a:r>
           </a:p>
         </p:txBody>
@@ -10368,7 +10734,81 @@
                   <a:srgbClr val="0000FF"/>
                 </a:solidFill>
               </a:rPr>
-              <a:t>"Princess Alice 1861.png"</a:t>
+              <a:t>Q155566</a:t>
+            </a:r>
+          </a:p>
+        </p:txBody>
+      </p:sp>
+      <p:sp>
+        <p:nvSpPr>
+          <p:cNvPr name="TextBox 5" id="6"/>
+          <p:cNvSpPr txBox="true"/>
+          <p:nvPr/>
+        </p:nvSpPr>
+        <p:spPr>
+          <a:xfrm>
+            <a:off x="254000" y="1016000"/>
+            <a:ext cx="1905000" cy="381000"/>
+          </a:xfrm>
+          <a:prstGeom prst="rect">
+            <a:avLst/>
+          </a:prstGeom>
+        </p:spPr>
+        <p:txBody>
+          <a:bodyPr anchor="t" rtlCol="false"/>
+          <a:lstStyle/>
+          <a:p>
+            <a:pPr algn="l"/>
+            <a:r>
+              <a:t/>
+            </a:r>
+            <a:endParaRPr lang="en-US" sz="1100"/>
+          </a:p>
+          <a:p>
+            <a:r>
+              <a:rPr lang="en-US" sz="2400">
+                <a:solidFill>
+                  <a:srgbClr val="000000"/>
+                </a:solidFill>
+              </a:rPr>
+              <a:t>source:</a:t>
+            </a:r>
+          </a:p>
+        </p:txBody>
+      </p:sp>
+      <p:sp>
+        <p:nvSpPr>
+          <p:cNvPr name="TextBox 6" id="7"/>
+          <p:cNvSpPr txBox="true"/>
+          <p:nvPr/>
+        </p:nvSpPr>
+        <p:spPr>
+          <a:xfrm>
+            <a:off x="2159000" y="1016000"/>
+            <a:ext cx="6350000" cy="381000"/>
+          </a:xfrm>
+          <a:prstGeom prst="rect">
+            <a:avLst/>
+          </a:prstGeom>
+        </p:spPr>
+        <p:txBody>
+          <a:bodyPr anchor="t" rtlCol="false"/>
+          <a:lstStyle/>
+          <a:p>
+            <a:pPr algn="l"/>
+            <a:r>
+              <a:t/>
+            </a:r>
+            <a:endParaRPr lang="en-US" sz="1100"/>
+          </a:p>
+          <a:p>
+            <a:r>
+              <a:rPr lang="en-US" sz="2400">
+                <a:solidFill>
+                  <a:srgbClr val="0000FF"/>
+                </a:solidFill>
+              </a:rPr>
+              <a:t>WikiData</a:t>
             </a:r>
           </a:p>
         </p:txBody>
@@ -10505,7 +10945,7 @@
                   <a:srgbClr val="000000"/>
                 </a:solidFill>
               </a:rPr>
-              <a:t>image:</a:t>
+              <a:t>wikidata_id:</a:t>
             </a:r>
           </a:p>
         </p:txBody>
@@ -10542,7 +10982,81 @@
                   <a:srgbClr val="0000FF"/>
                 </a:solidFill>
               </a:rPr>
-              <a:t>"Alfred-sachsen-coburg-gotha.jpg"</a:t>
+              <a:t>Q158143</a:t>
+            </a:r>
+          </a:p>
+        </p:txBody>
+      </p:sp>
+      <p:sp>
+        <p:nvSpPr>
+          <p:cNvPr name="TextBox 5" id="6"/>
+          <p:cNvSpPr txBox="true"/>
+          <p:nvPr/>
+        </p:nvSpPr>
+        <p:spPr>
+          <a:xfrm>
+            <a:off x="254000" y="1016000"/>
+            <a:ext cx="1905000" cy="381000"/>
+          </a:xfrm>
+          <a:prstGeom prst="rect">
+            <a:avLst/>
+          </a:prstGeom>
+        </p:spPr>
+        <p:txBody>
+          <a:bodyPr anchor="t" rtlCol="false"/>
+          <a:lstStyle/>
+          <a:p>
+            <a:pPr algn="l"/>
+            <a:r>
+              <a:t/>
+            </a:r>
+            <a:endParaRPr lang="en-US" sz="1100"/>
+          </a:p>
+          <a:p>
+            <a:r>
+              <a:rPr lang="en-US" sz="2400">
+                <a:solidFill>
+                  <a:srgbClr val="000000"/>
+                </a:solidFill>
+              </a:rPr>
+              <a:t>source:</a:t>
+            </a:r>
+          </a:p>
+        </p:txBody>
+      </p:sp>
+      <p:sp>
+        <p:nvSpPr>
+          <p:cNvPr name="TextBox 6" id="7"/>
+          <p:cNvSpPr txBox="true"/>
+          <p:nvPr/>
+        </p:nvSpPr>
+        <p:spPr>
+          <a:xfrm>
+            <a:off x="2159000" y="1016000"/>
+            <a:ext cx="6350000" cy="381000"/>
+          </a:xfrm>
+          <a:prstGeom prst="rect">
+            <a:avLst/>
+          </a:prstGeom>
+        </p:spPr>
+        <p:txBody>
+          <a:bodyPr anchor="t" rtlCol="false"/>
+          <a:lstStyle/>
+          <a:p>
+            <a:pPr algn="l"/>
+            <a:r>
+              <a:t/>
+            </a:r>
+            <a:endParaRPr lang="en-US" sz="1100"/>
+          </a:p>
+          <a:p>
+            <a:r>
+              <a:rPr lang="en-US" sz="2400">
+                <a:solidFill>
+                  <a:srgbClr val="0000FF"/>
+                </a:solidFill>
+              </a:rPr>
+              <a:t>WikiData</a:t>
             </a:r>
           </a:p>
         </p:txBody>
@@ -10679,7 +11193,7 @@
                   <a:srgbClr val="000000"/>
                 </a:solidFill>
               </a:rPr>
-              <a:t>image:</a:t>
+              <a:t>wikidata_id:</a:t>
             </a:r>
           </a:p>
         </p:txBody>
@@ -10716,7 +11230,81 @@
                   <a:srgbClr val="0000FF"/>
                 </a:solidFill>
               </a:rPr>
-              <a:t>"Helena scan.jpg"</a:t>
+              <a:t>Q160539</a:t>
+            </a:r>
+          </a:p>
+        </p:txBody>
+      </p:sp>
+      <p:sp>
+        <p:nvSpPr>
+          <p:cNvPr name="TextBox 5" id="6"/>
+          <p:cNvSpPr txBox="true"/>
+          <p:nvPr/>
+        </p:nvSpPr>
+        <p:spPr>
+          <a:xfrm>
+            <a:off x="254000" y="1016000"/>
+            <a:ext cx="1905000" cy="381000"/>
+          </a:xfrm>
+          <a:prstGeom prst="rect">
+            <a:avLst/>
+          </a:prstGeom>
+        </p:spPr>
+        <p:txBody>
+          <a:bodyPr anchor="t" rtlCol="false"/>
+          <a:lstStyle/>
+          <a:p>
+            <a:pPr algn="l"/>
+            <a:r>
+              <a:t/>
+            </a:r>
+            <a:endParaRPr lang="en-US" sz="1100"/>
+          </a:p>
+          <a:p>
+            <a:r>
+              <a:rPr lang="en-US" sz="2400">
+                <a:solidFill>
+                  <a:srgbClr val="000000"/>
+                </a:solidFill>
+              </a:rPr>
+              <a:t>source:</a:t>
+            </a:r>
+          </a:p>
+        </p:txBody>
+      </p:sp>
+      <p:sp>
+        <p:nvSpPr>
+          <p:cNvPr name="TextBox 6" id="7"/>
+          <p:cNvSpPr txBox="true"/>
+          <p:nvPr/>
+        </p:nvSpPr>
+        <p:spPr>
+          <a:xfrm>
+            <a:off x="2159000" y="1016000"/>
+            <a:ext cx="6350000" cy="381000"/>
+          </a:xfrm>
+          <a:prstGeom prst="rect">
+            <a:avLst/>
+          </a:prstGeom>
+        </p:spPr>
+        <p:txBody>
+          <a:bodyPr anchor="t" rtlCol="false"/>
+          <a:lstStyle/>
+          <a:p>
+            <a:pPr algn="l"/>
+            <a:r>
+              <a:t/>
+            </a:r>
+            <a:endParaRPr lang="en-US" sz="1100"/>
+          </a:p>
+          <a:p>
+            <a:r>
+              <a:rPr lang="en-US" sz="2400">
+                <a:solidFill>
+                  <a:srgbClr val="0000FF"/>
+                </a:solidFill>
+              </a:rPr>
+              <a:t>WikiData</a:t>
             </a:r>
           </a:p>
         </p:txBody>
@@ -10853,7 +11441,7 @@
                   <a:srgbClr val="000000"/>
                 </a:solidFill>
               </a:rPr>
-              <a:t>image:</a:t>
+              <a:t>wikidata_id:</a:t>
             </a:r>
           </a:p>
         </p:txBody>
@@ -10890,7 +11478,81 @@
                   <a:srgbClr val="0000FF"/>
                 </a:solidFill>
               </a:rPr>
-              <a:t>"Princess Louise 1901 copy.jpg"</a:t>
+              <a:t>Q161167</a:t>
+            </a:r>
+          </a:p>
+        </p:txBody>
+      </p:sp>
+      <p:sp>
+        <p:nvSpPr>
+          <p:cNvPr name="TextBox 5" id="6"/>
+          <p:cNvSpPr txBox="true"/>
+          <p:nvPr/>
+        </p:nvSpPr>
+        <p:spPr>
+          <a:xfrm>
+            <a:off x="254000" y="1016000"/>
+            <a:ext cx="1905000" cy="381000"/>
+          </a:xfrm>
+          <a:prstGeom prst="rect">
+            <a:avLst/>
+          </a:prstGeom>
+        </p:spPr>
+        <p:txBody>
+          <a:bodyPr anchor="t" rtlCol="false"/>
+          <a:lstStyle/>
+          <a:p>
+            <a:pPr algn="l"/>
+            <a:r>
+              <a:t/>
+            </a:r>
+            <a:endParaRPr lang="en-US" sz="1100"/>
+          </a:p>
+          <a:p>
+            <a:r>
+              <a:rPr lang="en-US" sz="2400">
+                <a:solidFill>
+                  <a:srgbClr val="000000"/>
+                </a:solidFill>
+              </a:rPr>
+              <a:t>source:</a:t>
+            </a:r>
+          </a:p>
+        </p:txBody>
+      </p:sp>
+      <p:sp>
+        <p:nvSpPr>
+          <p:cNvPr name="TextBox 6" id="7"/>
+          <p:cNvSpPr txBox="true"/>
+          <p:nvPr/>
+        </p:nvSpPr>
+        <p:spPr>
+          <a:xfrm>
+            <a:off x="2159000" y="1016000"/>
+            <a:ext cx="6350000" cy="381000"/>
+          </a:xfrm>
+          <a:prstGeom prst="rect">
+            <a:avLst/>
+          </a:prstGeom>
+        </p:spPr>
+        <p:txBody>
+          <a:bodyPr anchor="t" rtlCol="false"/>
+          <a:lstStyle/>
+          <a:p>
+            <a:pPr algn="l"/>
+            <a:r>
+              <a:t/>
+            </a:r>
+            <a:endParaRPr lang="en-US" sz="1100"/>
+          </a:p>
+          <a:p>
+            <a:r>
+              <a:rPr lang="en-US" sz="2400">
+                <a:solidFill>
+                  <a:srgbClr val="0000FF"/>
+                </a:solidFill>
+              </a:rPr>
+              <a:t>WikiData</a:t>
             </a:r>
           </a:p>
         </p:txBody>
@@ -11027,7 +11689,7 @@
                   <a:srgbClr val="000000"/>
                 </a:solidFill>
               </a:rPr>
-              <a:t>image:</a:t>
+              <a:t>wikidata_id:</a:t>
             </a:r>
           </a:p>
         </p:txBody>
@@ -11064,7 +11726,81 @@
                   <a:srgbClr val="0000FF"/>
                 </a:solidFill>
               </a:rPr>
-              <a:t>"Duke of Connaught and Strathearn.jpg"</a:t>
+              <a:t>Q160558</a:t>
+            </a:r>
+          </a:p>
+        </p:txBody>
+      </p:sp>
+      <p:sp>
+        <p:nvSpPr>
+          <p:cNvPr name="TextBox 5" id="6"/>
+          <p:cNvSpPr txBox="true"/>
+          <p:nvPr/>
+        </p:nvSpPr>
+        <p:spPr>
+          <a:xfrm>
+            <a:off x="254000" y="1016000"/>
+            <a:ext cx="1905000" cy="381000"/>
+          </a:xfrm>
+          <a:prstGeom prst="rect">
+            <a:avLst/>
+          </a:prstGeom>
+        </p:spPr>
+        <p:txBody>
+          <a:bodyPr anchor="t" rtlCol="false"/>
+          <a:lstStyle/>
+          <a:p>
+            <a:pPr algn="l"/>
+            <a:r>
+              <a:t/>
+            </a:r>
+            <a:endParaRPr lang="en-US" sz="1100"/>
+          </a:p>
+          <a:p>
+            <a:r>
+              <a:rPr lang="en-US" sz="2400">
+                <a:solidFill>
+                  <a:srgbClr val="000000"/>
+                </a:solidFill>
+              </a:rPr>
+              <a:t>source:</a:t>
+            </a:r>
+          </a:p>
+        </p:txBody>
+      </p:sp>
+      <p:sp>
+        <p:nvSpPr>
+          <p:cNvPr name="TextBox 6" id="7"/>
+          <p:cNvSpPr txBox="true"/>
+          <p:nvPr/>
+        </p:nvSpPr>
+        <p:spPr>
+          <a:xfrm>
+            <a:off x="2159000" y="1016000"/>
+            <a:ext cx="6350000" cy="381000"/>
+          </a:xfrm>
+          <a:prstGeom prst="rect">
+            <a:avLst/>
+          </a:prstGeom>
+        </p:spPr>
+        <p:txBody>
+          <a:bodyPr anchor="t" rtlCol="false"/>
+          <a:lstStyle/>
+          <a:p>
+            <a:pPr algn="l"/>
+            <a:r>
+              <a:t/>
+            </a:r>
+            <a:endParaRPr lang="en-US" sz="1100"/>
+          </a:p>
+          <a:p>
+            <a:r>
+              <a:rPr lang="en-US" sz="2400">
+                <a:solidFill>
+                  <a:srgbClr val="0000FF"/>
+                </a:solidFill>
+              </a:rPr>
+              <a:t>WikiData</a:t>
             </a:r>
           </a:p>
         </p:txBody>
@@ -11201,7 +11937,7 @@
                   <a:srgbClr val="000000"/>
                 </a:solidFill>
               </a:rPr>
-              <a:t>image:</a:t>
+              <a:t>wikidata_id:</a:t>
             </a:r>
           </a:p>
         </p:txBody>
@@ -11238,7 +11974,81 @@
                   <a:srgbClr val="0000FF"/>
                 </a:solidFill>
               </a:rPr>
-              <a:t>"Prince Leopold, Duke of Albany - Project Gutenberg eText 13103.jpg"</a:t>
+              <a:t>Q160541</a:t>
+            </a:r>
+          </a:p>
+        </p:txBody>
+      </p:sp>
+      <p:sp>
+        <p:nvSpPr>
+          <p:cNvPr name="TextBox 5" id="6"/>
+          <p:cNvSpPr txBox="true"/>
+          <p:nvPr/>
+        </p:nvSpPr>
+        <p:spPr>
+          <a:xfrm>
+            <a:off x="254000" y="1016000"/>
+            <a:ext cx="1905000" cy="381000"/>
+          </a:xfrm>
+          <a:prstGeom prst="rect">
+            <a:avLst/>
+          </a:prstGeom>
+        </p:spPr>
+        <p:txBody>
+          <a:bodyPr anchor="t" rtlCol="false"/>
+          <a:lstStyle/>
+          <a:p>
+            <a:pPr algn="l"/>
+            <a:r>
+              <a:t/>
+            </a:r>
+            <a:endParaRPr lang="en-US" sz="1100"/>
+          </a:p>
+          <a:p>
+            <a:r>
+              <a:rPr lang="en-US" sz="2400">
+                <a:solidFill>
+                  <a:srgbClr val="000000"/>
+                </a:solidFill>
+              </a:rPr>
+              <a:t>source:</a:t>
+            </a:r>
+          </a:p>
+        </p:txBody>
+      </p:sp>
+      <p:sp>
+        <p:nvSpPr>
+          <p:cNvPr name="TextBox 6" id="7"/>
+          <p:cNvSpPr txBox="true"/>
+          <p:nvPr/>
+        </p:nvSpPr>
+        <p:spPr>
+          <a:xfrm>
+            <a:off x="2159000" y="1016000"/>
+            <a:ext cx="6350000" cy="381000"/>
+          </a:xfrm>
+          <a:prstGeom prst="rect">
+            <a:avLst/>
+          </a:prstGeom>
+        </p:spPr>
+        <p:txBody>
+          <a:bodyPr anchor="t" rtlCol="false"/>
+          <a:lstStyle/>
+          <a:p>
+            <a:pPr algn="l"/>
+            <a:r>
+              <a:t/>
+            </a:r>
+            <a:endParaRPr lang="en-US" sz="1100"/>
+          </a:p>
+          <a:p>
+            <a:r>
+              <a:rPr lang="en-US" sz="2400">
+                <a:solidFill>
+                  <a:srgbClr val="0000FF"/>
+                </a:solidFill>
+              </a:rPr>
+              <a:t>WikiData</a:t>
             </a:r>
           </a:p>
         </p:txBody>

</xml_diff>